<commit_message>
Added onda color themes. Reduced x-axis break frequency for Surv_Plot() by tank
</commit_message>
<xml_diff>
--- a/vignettes/ONDA_XX-Hazard-Curve.pptx
+++ b/vignettes/ONDA_XX-Hazard-Curve.pptx
@@ -2660,7 +2660,7 @@
           </p:nvSpPr>
           <p:spPr>
             <a:xfrm>
-              <a:off x="1504602" y="983989"/>
+              <a:off x="1539894" y="983989"/>
               <a:ext cx="0" cy="3188077"/>
             </a:xfrm>
             <a:custGeom>
@@ -2703,7 +2703,7 @@
           </p:nvSpPr>
           <p:spPr>
             <a:xfrm>
-              <a:off x="1857516" y="983989"/>
+              <a:off x="1822225" y="983989"/>
               <a:ext cx="0" cy="3188077"/>
             </a:xfrm>
             <a:custGeom>
@@ -2746,7 +2746,7 @@
           </p:nvSpPr>
           <p:spPr>
             <a:xfrm>
-              <a:off x="2210430" y="983989"/>
+              <a:off x="2104556" y="983989"/>
               <a:ext cx="0" cy="3188077"/>
             </a:xfrm>
             <a:custGeom>
@@ -2789,7 +2789,7 @@
           </p:nvSpPr>
           <p:spPr>
             <a:xfrm>
-              <a:off x="2563343" y="983989"/>
+              <a:off x="2386887" y="983989"/>
               <a:ext cx="0" cy="3188077"/>
             </a:xfrm>
             <a:custGeom>
@@ -2832,7 +2832,7 @@
           </p:nvSpPr>
           <p:spPr>
             <a:xfrm>
-              <a:off x="2916257" y="983989"/>
+              <a:off x="2669217" y="983989"/>
               <a:ext cx="0" cy="3188077"/>
             </a:xfrm>
             <a:custGeom>
@@ -2875,7 +2875,7 @@
           </p:nvSpPr>
           <p:spPr>
             <a:xfrm>
-              <a:off x="3269171" y="983989"/>
+              <a:off x="2951548" y="983989"/>
               <a:ext cx="0" cy="3188077"/>
             </a:xfrm>
             <a:custGeom>
@@ -2918,7 +2918,7 @@
           </p:nvSpPr>
           <p:spPr>
             <a:xfrm>
-              <a:off x="3622084" y="983989"/>
+              <a:off x="3233879" y="983989"/>
               <a:ext cx="0" cy="3188077"/>
             </a:xfrm>
             <a:custGeom>
@@ -2961,7 +2961,7 @@
           </p:nvSpPr>
           <p:spPr>
             <a:xfrm>
-              <a:off x="3974998" y="983989"/>
+              <a:off x="3516210" y="983989"/>
               <a:ext cx="0" cy="3188077"/>
             </a:xfrm>
             <a:custGeom>
@@ -3004,7 +3004,7 @@
           </p:nvSpPr>
           <p:spPr>
             <a:xfrm>
-              <a:off x="4327911" y="983989"/>
+              <a:off x="3798541" y="983989"/>
               <a:ext cx="0" cy="3188077"/>
             </a:xfrm>
             <a:custGeom>
@@ -3047,7 +3047,7 @@
           </p:nvSpPr>
           <p:spPr>
             <a:xfrm>
-              <a:off x="4680825" y="983989"/>
+              <a:off x="4080872" y="983989"/>
               <a:ext cx="0" cy="3188077"/>
             </a:xfrm>
             <a:custGeom>
@@ -3090,7 +3090,7 @@
           </p:nvSpPr>
           <p:spPr>
             <a:xfrm>
-              <a:off x="5033739" y="983989"/>
+              <a:off x="4363203" y="983989"/>
               <a:ext cx="0" cy="3188077"/>
             </a:xfrm>
             <a:custGeom>
@@ -3133,7 +3133,7 @@
           </p:nvSpPr>
           <p:spPr>
             <a:xfrm>
-              <a:off x="5386652" y="983989"/>
+              <a:off x="4645534" y="983989"/>
               <a:ext cx="0" cy="3188077"/>
             </a:xfrm>
             <a:custGeom>
@@ -3176,6 +3176,135 @@
           </p:nvSpPr>
           <p:spPr>
             <a:xfrm>
+              <a:off x="4927865" y="983989"/>
+              <a:ext cx="0" cy="3188077"/>
+            </a:xfrm>
+            <a:custGeom>
+              <a:avLst/>
+              <a:pathLst>
+                <a:path w="0" h="3188077">
+                  <a:moveTo>
+                    <a:pt x="0" y="3188077"/>
+                  </a:moveTo>
+                  <a:lnTo>
+                    <a:pt x="0" y="0"/>
+                  </a:lnTo>
+                  <a:lnTo>
+                    <a:pt x="0" y="0"/>
+                  </a:lnTo>
+                </a:path>
+              </a:pathLst>
+            </a:custGeom>
+            <a:ln w="6775" cap="flat">
+              <a:solidFill>
+                <a:srgbClr val="FFFFFF">
+                  <a:alpha val="100000"/>
+                </a:srgbClr>
+              </a:solidFill>
+              <a:prstDash val="solid"/>
+              <a:round/>
+            </a:ln>
+          </p:spPr>
+          <p:txBody>
+            <a:bodyPr/>
+            <a:lstStyle/>
+            <a:p/>
+          </p:txBody>
+        </p:sp>
+        <p:sp>
+          <p:nvSpPr>
+            <p:cNvPr id="27" name="pl26"/>
+            <p:cNvSpPr/>
+            <p:nvPr/>
+          </p:nvSpPr>
+          <p:spPr>
+            <a:xfrm>
+              <a:off x="5210196" y="983989"/>
+              <a:ext cx="0" cy="3188077"/>
+            </a:xfrm>
+            <a:custGeom>
+              <a:avLst/>
+              <a:pathLst>
+                <a:path w="0" h="3188077">
+                  <a:moveTo>
+                    <a:pt x="0" y="3188077"/>
+                  </a:moveTo>
+                  <a:lnTo>
+                    <a:pt x="0" y="0"/>
+                  </a:lnTo>
+                  <a:lnTo>
+                    <a:pt x="0" y="0"/>
+                  </a:lnTo>
+                </a:path>
+              </a:pathLst>
+            </a:custGeom>
+            <a:ln w="6775" cap="flat">
+              <a:solidFill>
+                <a:srgbClr val="FFFFFF">
+                  <a:alpha val="100000"/>
+                </a:srgbClr>
+              </a:solidFill>
+              <a:prstDash val="solid"/>
+              <a:round/>
+            </a:ln>
+          </p:spPr>
+          <p:txBody>
+            <a:bodyPr/>
+            <a:lstStyle/>
+            <a:p/>
+          </p:txBody>
+        </p:sp>
+        <p:sp>
+          <p:nvSpPr>
+            <p:cNvPr id="28" name="pl27"/>
+            <p:cNvSpPr/>
+            <p:nvPr/>
+          </p:nvSpPr>
+          <p:spPr>
+            <a:xfrm>
+              <a:off x="5492526" y="983989"/>
+              <a:ext cx="0" cy="3188077"/>
+            </a:xfrm>
+            <a:custGeom>
+              <a:avLst/>
+              <a:pathLst>
+                <a:path w="0" h="3188077">
+                  <a:moveTo>
+                    <a:pt x="0" y="3188077"/>
+                  </a:moveTo>
+                  <a:lnTo>
+                    <a:pt x="0" y="0"/>
+                  </a:lnTo>
+                  <a:lnTo>
+                    <a:pt x="0" y="0"/>
+                  </a:lnTo>
+                </a:path>
+              </a:pathLst>
+            </a:custGeom>
+            <a:ln w="6775" cap="flat">
+              <a:solidFill>
+                <a:srgbClr val="FFFFFF">
+                  <a:alpha val="100000"/>
+                </a:srgbClr>
+              </a:solidFill>
+              <a:prstDash val="solid"/>
+              <a:round/>
+            </a:ln>
+          </p:spPr>
+          <p:txBody>
+            <a:bodyPr/>
+            <a:lstStyle/>
+            <a:p/>
+          </p:txBody>
+        </p:sp>
+        <p:sp>
+          <p:nvSpPr>
+            <p:cNvPr id="29" name="pl28"/>
+            <p:cNvSpPr/>
+            <p:nvPr/>
+          </p:nvSpPr>
+          <p:spPr>
+            <a:xfrm>
               <a:off x="1490486" y="4040699"/>
               <a:ext cx="4192613" cy="0"/>
             </a:xfrm>
@@ -3213,7 +3342,7 @@
         </p:sp>
         <p:sp>
           <p:nvSpPr>
-            <p:cNvPr id="27" name="pl26"/>
+            <p:cNvPr id="30" name="pl29"/>
             <p:cNvSpPr/>
             <p:nvPr/>
           </p:nvSpPr>
@@ -3256,7 +3385,7 @@
         </p:sp>
         <p:sp>
           <p:nvSpPr>
-            <p:cNvPr id="28" name="pl27"/>
+            <p:cNvPr id="31" name="pl30"/>
             <p:cNvSpPr/>
             <p:nvPr/>
           </p:nvSpPr>
@@ -3299,7 +3428,7 @@
         </p:sp>
         <p:sp>
           <p:nvSpPr>
-            <p:cNvPr id="29" name="pl28"/>
+            <p:cNvPr id="32" name="pl31"/>
             <p:cNvSpPr/>
             <p:nvPr/>
           </p:nvSpPr>
@@ -3342,7 +3471,7 @@
         </p:sp>
         <p:sp>
           <p:nvSpPr>
-            <p:cNvPr id="30" name="pl29"/>
+            <p:cNvPr id="33" name="pl32"/>
             <p:cNvSpPr/>
             <p:nvPr/>
           </p:nvSpPr>
@@ -3385,7 +3514,7 @@
         </p:sp>
         <p:sp>
           <p:nvSpPr>
-            <p:cNvPr id="31" name="pl30"/>
+            <p:cNvPr id="34" name="pl33"/>
             <p:cNvSpPr/>
             <p:nvPr/>
           </p:nvSpPr>
@@ -3428,7 +3557,7 @@
         </p:sp>
         <p:sp>
           <p:nvSpPr>
-            <p:cNvPr id="32" name="pl31"/>
+            <p:cNvPr id="35" name="pl34"/>
             <p:cNvSpPr/>
             <p:nvPr/>
           </p:nvSpPr>
@@ -3471,7 +3600,7 @@
         </p:sp>
         <p:sp>
           <p:nvSpPr>
-            <p:cNvPr id="33" name="pl32"/>
+            <p:cNvPr id="36" name="pl35"/>
             <p:cNvSpPr/>
             <p:nvPr/>
           </p:nvSpPr>
@@ -3514,13 +3643,13 @@
         </p:sp>
         <p:sp>
           <p:nvSpPr>
-            <p:cNvPr id="34" name="pl33"/>
-            <p:cNvSpPr/>
-            <p:nvPr/>
-          </p:nvSpPr>
-          <p:spPr>
-            <a:xfrm>
-              <a:off x="2033973" y="983989"/>
+            <p:cNvPr id="37" name="pl36"/>
+            <p:cNvSpPr/>
+            <p:nvPr/>
+          </p:nvSpPr>
+          <p:spPr>
+            <a:xfrm>
+              <a:off x="1963390" y="983989"/>
               <a:ext cx="0" cy="3188077"/>
             </a:xfrm>
             <a:custGeom>
@@ -3557,13 +3686,13 @@
         </p:sp>
         <p:sp>
           <p:nvSpPr>
-            <p:cNvPr id="35" name="pl34"/>
-            <p:cNvSpPr/>
-            <p:nvPr/>
-          </p:nvSpPr>
-          <p:spPr>
-            <a:xfrm>
-              <a:off x="2386887" y="983989"/>
+            <p:cNvPr id="38" name="pl37"/>
+            <p:cNvSpPr/>
+            <p:nvPr/>
+          </p:nvSpPr>
+          <p:spPr>
+            <a:xfrm>
+              <a:off x="2245721" y="983989"/>
               <a:ext cx="0" cy="3188077"/>
             </a:xfrm>
             <a:custGeom>
@@ -3600,13 +3729,13 @@
         </p:sp>
         <p:sp>
           <p:nvSpPr>
-            <p:cNvPr id="36" name="pl35"/>
-            <p:cNvSpPr/>
-            <p:nvPr/>
-          </p:nvSpPr>
-          <p:spPr>
-            <a:xfrm>
-              <a:off x="2739800" y="983989"/>
+            <p:cNvPr id="39" name="pl38"/>
+            <p:cNvSpPr/>
+            <p:nvPr/>
+          </p:nvSpPr>
+          <p:spPr>
+            <a:xfrm>
+              <a:off x="2528052" y="983989"/>
               <a:ext cx="0" cy="3188077"/>
             </a:xfrm>
             <a:custGeom>
@@ -3643,13 +3772,13 @@
         </p:sp>
         <p:sp>
           <p:nvSpPr>
-            <p:cNvPr id="37" name="pl36"/>
-            <p:cNvSpPr/>
-            <p:nvPr/>
-          </p:nvSpPr>
-          <p:spPr>
-            <a:xfrm>
-              <a:off x="3092714" y="983989"/>
+            <p:cNvPr id="40" name="pl39"/>
+            <p:cNvSpPr/>
+            <p:nvPr/>
+          </p:nvSpPr>
+          <p:spPr>
+            <a:xfrm>
+              <a:off x="2810383" y="983989"/>
               <a:ext cx="0" cy="3188077"/>
             </a:xfrm>
             <a:custGeom>
@@ -3686,13 +3815,13 @@
         </p:sp>
         <p:sp>
           <p:nvSpPr>
-            <p:cNvPr id="38" name="pl37"/>
-            <p:cNvSpPr/>
-            <p:nvPr/>
-          </p:nvSpPr>
-          <p:spPr>
-            <a:xfrm>
-              <a:off x="3445627" y="983989"/>
+            <p:cNvPr id="41" name="pl40"/>
+            <p:cNvSpPr/>
+            <p:nvPr/>
+          </p:nvSpPr>
+          <p:spPr>
+            <a:xfrm>
+              <a:off x="3092714" y="983989"/>
               <a:ext cx="0" cy="3188077"/>
             </a:xfrm>
             <a:custGeom>
@@ -3729,13 +3858,13 @@
         </p:sp>
         <p:sp>
           <p:nvSpPr>
-            <p:cNvPr id="39" name="pl38"/>
-            <p:cNvSpPr/>
-            <p:nvPr/>
-          </p:nvSpPr>
-          <p:spPr>
-            <a:xfrm>
-              <a:off x="3798541" y="983989"/>
+            <p:cNvPr id="42" name="pl41"/>
+            <p:cNvSpPr/>
+            <p:nvPr/>
+          </p:nvSpPr>
+          <p:spPr>
+            <a:xfrm>
+              <a:off x="3375045" y="983989"/>
               <a:ext cx="0" cy="3188077"/>
             </a:xfrm>
             <a:custGeom>
@@ -3772,13 +3901,13 @@
         </p:sp>
         <p:sp>
           <p:nvSpPr>
-            <p:cNvPr id="40" name="pl39"/>
-            <p:cNvSpPr/>
-            <p:nvPr/>
-          </p:nvSpPr>
-          <p:spPr>
-            <a:xfrm>
-              <a:off x="4151455" y="983989"/>
+            <p:cNvPr id="43" name="pl42"/>
+            <p:cNvSpPr/>
+            <p:nvPr/>
+          </p:nvSpPr>
+          <p:spPr>
+            <a:xfrm>
+              <a:off x="3657376" y="983989"/>
               <a:ext cx="0" cy="3188077"/>
             </a:xfrm>
             <a:custGeom>
@@ -3815,13 +3944,13 @@
         </p:sp>
         <p:sp>
           <p:nvSpPr>
-            <p:cNvPr id="41" name="pl40"/>
-            <p:cNvSpPr/>
-            <p:nvPr/>
-          </p:nvSpPr>
-          <p:spPr>
-            <a:xfrm>
-              <a:off x="4504368" y="983989"/>
+            <p:cNvPr id="44" name="pl43"/>
+            <p:cNvSpPr/>
+            <p:nvPr/>
+          </p:nvSpPr>
+          <p:spPr>
+            <a:xfrm>
+              <a:off x="3939706" y="983989"/>
               <a:ext cx="0" cy="3188077"/>
             </a:xfrm>
             <a:custGeom>
@@ -3858,13 +3987,13 @@
         </p:sp>
         <p:sp>
           <p:nvSpPr>
-            <p:cNvPr id="42" name="pl41"/>
-            <p:cNvSpPr/>
-            <p:nvPr/>
-          </p:nvSpPr>
-          <p:spPr>
-            <a:xfrm>
-              <a:off x="4857282" y="983989"/>
+            <p:cNvPr id="45" name="pl44"/>
+            <p:cNvSpPr/>
+            <p:nvPr/>
+          </p:nvSpPr>
+          <p:spPr>
+            <a:xfrm>
+              <a:off x="4222037" y="983989"/>
               <a:ext cx="0" cy="3188077"/>
             </a:xfrm>
             <a:custGeom>
@@ -3901,13 +4030,13 @@
         </p:sp>
         <p:sp>
           <p:nvSpPr>
-            <p:cNvPr id="43" name="pl42"/>
-            <p:cNvSpPr/>
-            <p:nvPr/>
-          </p:nvSpPr>
-          <p:spPr>
-            <a:xfrm>
-              <a:off x="5210196" y="983989"/>
+            <p:cNvPr id="46" name="pl45"/>
+            <p:cNvSpPr/>
+            <p:nvPr/>
+          </p:nvSpPr>
+          <p:spPr>
+            <a:xfrm>
+              <a:off x="4504368" y="983989"/>
               <a:ext cx="0" cy="3188077"/>
             </a:xfrm>
             <a:custGeom>
@@ -3944,13 +4073,13 @@
         </p:sp>
         <p:sp>
           <p:nvSpPr>
-            <p:cNvPr id="44" name="pl43"/>
-            <p:cNvSpPr/>
-            <p:nvPr/>
-          </p:nvSpPr>
-          <p:spPr>
-            <a:xfrm>
-              <a:off x="5563109" y="983989"/>
+            <p:cNvPr id="47" name="pl46"/>
+            <p:cNvSpPr/>
+            <p:nvPr/>
+          </p:nvSpPr>
+          <p:spPr>
+            <a:xfrm>
+              <a:off x="4786699" y="983989"/>
               <a:ext cx="0" cy="3188077"/>
             </a:xfrm>
             <a:custGeom>
@@ -3987,7 +4116,136 @@
         </p:sp>
         <p:sp>
           <p:nvSpPr>
-            <p:cNvPr id="45" name="pl44"/>
+            <p:cNvPr id="48" name="pl47"/>
+            <p:cNvSpPr/>
+            <p:nvPr/>
+          </p:nvSpPr>
+          <p:spPr>
+            <a:xfrm>
+              <a:off x="5069030" y="983989"/>
+              <a:ext cx="0" cy="3188077"/>
+            </a:xfrm>
+            <a:custGeom>
+              <a:avLst/>
+              <a:pathLst>
+                <a:path w="0" h="3188077">
+                  <a:moveTo>
+                    <a:pt x="0" y="3188077"/>
+                  </a:moveTo>
+                  <a:lnTo>
+                    <a:pt x="0" y="0"/>
+                  </a:lnTo>
+                  <a:lnTo>
+                    <a:pt x="0" y="0"/>
+                  </a:lnTo>
+                </a:path>
+              </a:pathLst>
+            </a:custGeom>
+            <a:ln w="13550" cap="flat">
+              <a:solidFill>
+                <a:srgbClr val="FFFFFF">
+                  <a:alpha val="100000"/>
+                </a:srgbClr>
+              </a:solidFill>
+              <a:prstDash val="solid"/>
+              <a:round/>
+            </a:ln>
+          </p:spPr>
+          <p:txBody>
+            <a:bodyPr/>
+            <a:lstStyle/>
+            <a:p/>
+          </p:txBody>
+        </p:sp>
+        <p:sp>
+          <p:nvSpPr>
+            <p:cNvPr id="49" name="pl48"/>
+            <p:cNvSpPr/>
+            <p:nvPr/>
+          </p:nvSpPr>
+          <p:spPr>
+            <a:xfrm>
+              <a:off x="5351361" y="983989"/>
+              <a:ext cx="0" cy="3188077"/>
+            </a:xfrm>
+            <a:custGeom>
+              <a:avLst/>
+              <a:pathLst>
+                <a:path w="0" h="3188077">
+                  <a:moveTo>
+                    <a:pt x="0" y="3188077"/>
+                  </a:moveTo>
+                  <a:lnTo>
+                    <a:pt x="0" y="0"/>
+                  </a:lnTo>
+                  <a:lnTo>
+                    <a:pt x="0" y="0"/>
+                  </a:lnTo>
+                </a:path>
+              </a:pathLst>
+            </a:custGeom>
+            <a:ln w="13550" cap="flat">
+              <a:solidFill>
+                <a:srgbClr val="FFFFFF">
+                  <a:alpha val="100000"/>
+                </a:srgbClr>
+              </a:solidFill>
+              <a:prstDash val="solid"/>
+              <a:round/>
+            </a:ln>
+          </p:spPr>
+          <p:txBody>
+            <a:bodyPr/>
+            <a:lstStyle/>
+            <a:p/>
+          </p:txBody>
+        </p:sp>
+        <p:sp>
+          <p:nvSpPr>
+            <p:cNvPr id="50" name="pl49"/>
+            <p:cNvSpPr/>
+            <p:nvPr/>
+          </p:nvSpPr>
+          <p:spPr>
+            <a:xfrm>
+              <a:off x="5633692" y="983989"/>
+              <a:ext cx="0" cy="3188077"/>
+            </a:xfrm>
+            <a:custGeom>
+              <a:avLst/>
+              <a:pathLst>
+                <a:path w="0" h="3188077">
+                  <a:moveTo>
+                    <a:pt x="0" y="3188077"/>
+                  </a:moveTo>
+                  <a:lnTo>
+                    <a:pt x="0" y="0"/>
+                  </a:lnTo>
+                  <a:lnTo>
+                    <a:pt x="0" y="0"/>
+                  </a:lnTo>
+                </a:path>
+              </a:pathLst>
+            </a:custGeom>
+            <a:ln w="13550" cap="flat">
+              <a:solidFill>
+                <a:srgbClr val="FFFFFF">
+                  <a:alpha val="100000"/>
+                </a:srgbClr>
+              </a:solidFill>
+              <a:prstDash val="solid"/>
+              <a:round/>
+            </a:ln>
+          </p:spPr>
+          <p:txBody>
+            <a:bodyPr/>
+            <a:lstStyle/>
+            <a:p/>
+          </p:txBody>
+        </p:sp>
+        <p:sp>
+          <p:nvSpPr>
+            <p:cNvPr id="51" name="pl50"/>
             <p:cNvSpPr/>
             <p:nvPr/>
           </p:nvSpPr>
@@ -4096,7 +4354,7 @@
         </p:sp>
         <p:sp>
           <p:nvSpPr>
-            <p:cNvPr id="46" name="pl45"/>
+            <p:cNvPr id="52" name="pl51"/>
             <p:cNvSpPr/>
             <p:nvPr/>
           </p:nvSpPr>
@@ -4214,7 +4472,7 @@
         </p:sp>
         <p:sp>
           <p:nvSpPr>
-            <p:cNvPr id="47" name="pl46"/>
+            <p:cNvPr id="53" name="pl52"/>
             <p:cNvSpPr/>
             <p:nvPr/>
           </p:nvSpPr>
@@ -4326,7 +4584,7 @@
         </p:sp>
         <p:sp>
           <p:nvSpPr>
-            <p:cNvPr id="48" name="pl47"/>
+            <p:cNvPr id="54" name="pl53"/>
             <p:cNvSpPr/>
             <p:nvPr/>
           </p:nvSpPr>
@@ -4438,7 +4696,7 @@
         </p:sp>
         <p:sp>
           <p:nvSpPr>
-            <p:cNvPr id="49" name="pt48"/>
+            <p:cNvPr id="55" name="pt54"/>
             <p:cNvSpPr/>
             <p:nvPr/>
           </p:nvSpPr>
@@ -4473,7 +4731,7 @@
         </p:sp>
         <p:sp>
           <p:nvSpPr>
-            <p:cNvPr id="50" name="pt49"/>
+            <p:cNvPr id="56" name="pt55"/>
             <p:cNvSpPr/>
             <p:nvPr/>
           </p:nvSpPr>
@@ -4508,7 +4766,7 @@
         </p:sp>
         <p:sp>
           <p:nvSpPr>
-            <p:cNvPr id="51" name="pt50"/>
+            <p:cNvPr id="57" name="pt56"/>
             <p:cNvSpPr/>
             <p:nvPr/>
           </p:nvSpPr>
@@ -4543,7 +4801,7 @@
         </p:sp>
         <p:sp>
           <p:nvSpPr>
-            <p:cNvPr id="52" name="pt51"/>
+            <p:cNvPr id="58" name="pt57"/>
             <p:cNvSpPr/>
             <p:nvPr/>
           </p:nvSpPr>
@@ -4578,7 +4836,7 @@
         </p:sp>
         <p:sp>
           <p:nvSpPr>
-            <p:cNvPr id="53" name="pt52"/>
+            <p:cNvPr id="59" name="pt58"/>
             <p:cNvSpPr/>
             <p:nvPr/>
           </p:nvSpPr>
@@ -4613,7 +4871,7 @@
         </p:sp>
         <p:sp>
           <p:nvSpPr>
-            <p:cNvPr id="54" name="pt53"/>
+            <p:cNvPr id="60" name="pt59"/>
             <p:cNvSpPr/>
             <p:nvPr/>
           </p:nvSpPr>
@@ -4648,7 +4906,7 @@
         </p:sp>
         <p:sp>
           <p:nvSpPr>
-            <p:cNvPr id="55" name="pt54"/>
+            <p:cNvPr id="61" name="pt60"/>
             <p:cNvSpPr/>
             <p:nvPr/>
           </p:nvSpPr>
@@ -4683,7 +4941,7 @@
         </p:sp>
         <p:sp>
           <p:nvSpPr>
-            <p:cNvPr id="56" name="pt55"/>
+            <p:cNvPr id="62" name="pt61"/>
             <p:cNvSpPr/>
             <p:nvPr/>
           </p:nvSpPr>
@@ -4718,7 +4976,7 @@
         </p:sp>
         <p:sp>
           <p:nvSpPr>
-            <p:cNvPr id="57" name="pt56"/>
+            <p:cNvPr id="63" name="pt62"/>
             <p:cNvSpPr/>
             <p:nvPr/>
           </p:nvSpPr>
@@ -4753,7 +5011,7 @@
         </p:sp>
         <p:sp>
           <p:nvSpPr>
-            <p:cNvPr id="58" name="pt57"/>
+            <p:cNvPr id="64" name="pt63"/>
             <p:cNvSpPr/>
             <p:nvPr/>
           </p:nvSpPr>
@@ -4788,7 +5046,7 @@
         </p:sp>
         <p:sp>
           <p:nvSpPr>
-            <p:cNvPr id="59" name="pt58"/>
+            <p:cNvPr id="65" name="pt64"/>
             <p:cNvSpPr/>
             <p:nvPr/>
           </p:nvSpPr>
@@ -4823,7 +5081,7 @@
         </p:sp>
         <p:sp>
           <p:nvSpPr>
-            <p:cNvPr id="60" name="pt59"/>
+            <p:cNvPr id="66" name="pt65"/>
             <p:cNvSpPr/>
             <p:nvPr/>
           </p:nvSpPr>
@@ -4858,7 +5116,7 @@
         </p:sp>
         <p:sp>
           <p:nvSpPr>
-            <p:cNvPr id="61" name="pt60"/>
+            <p:cNvPr id="67" name="pt66"/>
             <p:cNvSpPr/>
             <p:nvPr/>
           </p:nvSpPr>
@@ -4893,7 +5151,7 @@
         </p:sp>
         <p:sp>
           <p:nvSpPr>
-            <p:cNvPr id="62" name="pt61"/>
+            <p:cNvPr id="68" name="pt67"/>
             <p:cNvSpPr/>
             <p:nvPr/>
           </p:nvSpPr>
@@ -4928,7 +5186,7 @@
         </p:sp>
         <p:sp>
           <p:nvSpPr>
-            <p:cNvPr id="63" name="pt62"/>
+            <p:cNvPr id="69" name="pt68"/>
             <p:cNvSpPr/>
             <p:nvPr/>
           </p:nvSpPr>
@@ -4963,7 +5221,7 @@
         </p:sp>
         <p:sp>
           <p:nvSpPr>
-            <p:cNvPr id="64" name="pt63"/>
+            <p:cNvPr id="70" name="pt69"/>
             <p:cNvSpPr/>
             <p:nvPr/>
           </p:nvSpPr>
@@ -4998,7 +5256,7 @@
         </p:sp>
         <p:sp>
           <p:nvSpPr>
-            <p:cNvPr id="65" name="pt64"/>
+            <p:cNvPr id="71" name="pt70"/>
             <p:cNvSpPr/>
             <p:nvPr/>
           </p:nvSpPr>
@@ -5033,7 +5291,7 @@
         </p:sp>
         <p:sp>
           <p:nvSpPr>
-            <p:cNvPr id="66" name="pt65"/>
+            <p:cNvPr id="72" name="pt71"/>
             <p:cNvSpPr/>
             <p:nvPr/>
           </p:nvSpPr>
@@ -5068,7 +5326,7 @@
         </p:sp>
         <p:sp>
           <p:nvSpPr>
-            <p:cNvPr id="67" name="pt66"/>
+            <p:cNvPr id="73" name="pt72"/>
             <p:cNvSpPr/>
             <p:nvPr/>
           </p:nvSpPr>
@@ -5103,7 +5361,7 @@
         </p:sp>
         <p:sp>
           <p:nvSpPr>
-            <p:cNvPr id="68" name="pt67"/>
+            <p:cNvPr id="74" name="pt73"/>
             <p:cNvSpPr/>
             <p:nvPr/>
           </p:nvSpPr>
@@ -5138,7 +5396,7 @@
         </p:sp>
         <p:sp>
           <p:nvSpPr>
-            <p:cNvPr id="69" name="pt68"/>
+            <p:cNvPr id="75" name="pt74"/>
             <p:cNvSpPr/>
             <p:nvPr/>
           </p:nvSpPr>
@@ -5173,7 +5431,7 @@
         </p:sp>
         <p:sp>
           <p:nvSpPr>
-            <p:cNvPr id="70" name="pt69"/>
+            <p:cNvPr id="76" name="pt75"/>
             <p:cNvSpPr/>
             <p:nvPr/>
           </p:nvSpPr>
@@ -5208,7 +5466,7 @@
         </p:sp>
         <p:sp>
           <p:nvSpPr>
-            <p:cNvPr id="71" name="pt70"/>
+            <p:cNvPr id="77" name="pt76"/>
             <p:cNvSpPr/>
             <p:nvPr/>
           </p:nvSpPr>
@@ -5243,7 +5501,7 @@
         </p:sp>
         <p:sp>
           <p:nvSpPr>
-            <p:cNvPr id="72" name="pt71"/>
+            <p:cNvPr id="78" name="pt77"/>
             <p:cNvSpPr/>
             <p:nvPr/>
           </p:nvSpPr>
@@ -5278,7 +5536,7 @@
         </p:sp>
         <p:sp>
           <p:nvSpPr>
-            <p:cNvPr id="73" name="pt72"/>
+            <p:cNvPr id="79" name="pt78"/>
             <p:cNvSpPr/>
             <p:nvPr/>
           </p:nvSpPr>
@@ -5313,7 +5571,7 @@
         </p:sp>
         <p:sp>
           <p:nvSpPr>
-            <p:cNvPr id="74" name="pt73"/>
+            <p:cNvPr id="80" name="pt79"/>
             <p:cNvSpPr/>
             <p:nvPr/>
           </p:nvSpPr>
@@ -5348,7 +5606,7 @@
         </p:sp>
         <p:sp>
           <p:nvSpPr>
-            <p:cNvPr id="75" name="pt74"/>
+            <p:cNvPr id="81" name="pt80"/>
             <p:cNvSpPr/>
             <p:nvPr/>
           </p:nvSpPr>
@@ -5383,7 +5641,7 @@
         </p:sp>
         <p:sp>
           <p:nvSpPr>
-            <p:cNvPr id="76" name="pt75"/>
+            <p:cNvPr id="82" name="pt81"/>
             <p:cNvSpPr/>
             <p:nvPr/>
           </p:nvSpPr>
@@ -5418,7 +5676,7 @@
         </p:sp>
         <p:sp>
           <p:nvSpPr>
-            <p:cNvPr id="77" name="pt76"/>
+            <p:cNvPr id="83" name="pt82"/>
             <p:cNvSpPr/>
             <p:nvPr/>
           </p:nvSpPr>
@@ -5453,7 +5711,7 @@
         </p:sp>
         <p:sp>
           <p:nvSpPr>
-            <p:cNvPr id="78" name="pt77"/>
+            <p:cNvPr id="84" name="pt83"/>
             <p:cNvSpPr/>
             <p:nvPr/>
           </p:nvSpPr>
@@ -5488,7 +5746,7 @@
         </p:sp>
         <p:sp>
           <p:nvSpPr>
-            <p:cNvPr id="79" name="pt78"/>
+            <p:cNvPr id="85" name="pt84"/>
             <p:cNvSpPr/>
             <p:nvPr/>
           </p:nvSpPr>
@@ -5523,7 +5781,7 @@
         </p:sp>
         <p:sp>
           <p:nvSpPr>
-            <p:cNvPr id="80" name="pt79"/>
+            <p:cNvPr id="86" name="pt85"/>
             <p:cNvSpPr/>
             <p:nvPr/>
           </p:nvSpPr>
@@ -5558,7 +5816,7 @@
         </p:sp>
         <p:sp>
           <p:nvSpPr>
-            <p:cNvPr id="81" name="pt80"/>
+            <p:cNvPr id="87" name="pt86"/>
             <p:cNvSpPr/>
             <p:nvPr/>
           </p:nvSpPr>
@@ -5593,7 +5851,7 @@
         </p:sp>
         <p:sp>
           <p:nvSpPr>
-            <p:cNvPr id="82" name="pt81"/>
+            <p:cNvPr id="88" name="pt87"/>
             <p:cNvSpPr/>
             <p:nvPr/>
           </p:nvSpPr>
@@ -5628,7 +5886,7 @@
         </p:sp>
         <p:sp>
           <p:nvSpPr>
-            <p:cNvPr id="83" name="pt82"/>
+            <p:cNvPr id="89" name="pt88"/>
             <p:cNvSpPr/>
             <p:nvPr/>
           </p:nvSpPr>
@@ -5663,7 +5921,7 @@
         </p:sp>
         <p:sp>
           <p:nvSpPr>
-            <p:cNvPr id="84" name="pt83"/>
+            <p:cNvPr id="90" name="pt89"/>
             <p:cNvSpPr/>
             <p:nvPr/>
           </p:nvSpPr>
@@ -5698,7 +5956,7 @@
         </p:sp>
         <p:sp>
           <p:nvSpPr>
-            <p:cNvPr id="85" name="pt84"/>
+            <p:cNvPr id="91" name="pt90"/>
             <p:cNvSpPr/>
             <p:nvPr/>
           </p:nvSpPr>
@@ -5733,7 +5991,7 @@
         </p:sp>
         <p:sp>
           <p:nvSpPr>
-            <p:cNvPr id="86" name="pt85"/>
+            <p:cNvPr id="92" name="pt91"/>
             <p:cNvSpPr/>
             <p:nvPr/>
           </p:nvSpPr>
@@ -5768,7 +6026,7 @@
         </p:sp>
         <p:sp>
           <p:nvSpPr>
-            <p:cNvPr id="87" name="pt86"/>
+            <p:cNvPr id="93" name="pt92"/>
             <p:cNvSpPr/>
             <p:nvPr/>
           </p:nvSpPr>
@@ -5803,7 +6061,7 @@
         </p:sp>
         <p:sp>
           <p:nvSpPr>
-            <p:cNvPr id="88" name="pt87"/>
+            <p:cNvPr id="94" name="pt93"/>
             <p:cNvSpPr/>
             <p:nvPr/>
           </p:nvSpPr>
@@ -5838,7 +6096,7 @@
         </p:sp>
         <p:sp>
           <p:nvSpPr>
-            <p:cNvPr id="89" name="pt88"/>
+            <p:cNvPr id="95" name="pt94"/>
             <p:cNvSpPr/>
             <p:nvPr/>
           </p:nvSpPr>
@@ -5873,7 +6131,7 @@
         </p:sp>
         <p:sp>
           <p:nvSpPr>
-            <p:cNvPr id="90" name="pt89"/>
+            <p:cNvPr id="96" name="pt95"/>
             <p:cNvSpPr/>
             <p:nvPr/>
           </p:nvSpPr>
@@ -5908,7 +6166,7 @@
         </p:sp>
         <p:sp>
           <p:nvSpPr>
-            <p:cNvPr id="91" name="pt90"/>
+            <p:cNvPr id="97" name="pt96"/>
             <p:cNvSpPr/>
             <p:nvPr/>
           </p:nvSpPr>
@@ -5943,7 +6201,7 @@
         </p:sp>
         <p:sp>
           <p:nvSpPr>
-            <p:cNvPr id="92" name="pt91"/>
+            <p:cNvPr id="98" name="pt97"/>
             <p:cNvSpPr/>
             <p:nvPr/>
           </p:nvSpPr>
@@ -5978,7 +6236,7 @@
         </p:sp>
         <p:sp>
           <p:nvSpPr>
-            <p:cNvPr id="93" name="pt92"/>
+            <p:cNvPr id="99" name="pt98"/>
             <p:cNvSpPr/>
             <p:nvPr/>
           </p:nvSpPr>
@@ -6013,7 +6271,7 @@
         </p:sp>
         <p:sp>
           <p:nvSpPr>
-            <p:cNvPr id="94" name="pt93"/>
+            <p:cNvPr id="100" name="pt99"/>
             <p:cNvSpPr/>
             <p:nvPr/>
           </p:nvSpPr>
@@ -6048,7 +6306,7 @@
         </p:sp>
         <p:sp>
           <p:nvSpPr>
-            <p:cNvPr id="95" name="pt94"/>
+            <p:cNvPr id="101" name="pt100"/>
             <p:cNvSpPr/>
             <p:nvPr/>
           </p:nvSpPr>
@@ -6083,7 +6341,7 @@
         </p:sp>
         <p:sp>
           <p:nvSpPr>
-            <p:cNvPr id="96" name="pt95"/>
+            <p:cNvPr id="102" name="pt101"/>
             <p:cNvSpPr/>
             <p:nvPr/>
           </p:nvSpPr>
@@ -6118,7 +6376,7 @@
         </p:sp>
         <p:sp>
           <p:nvSpPr>
-            <p:cNvPr id="97" name="pt96"/>
+            <p:cNvPr id="103" name="pt102"/>
             <p:cNvSpPr/>
             <p:nvPr/>
           </p:nvSpPr>
@@ -6153,7 +6411,7 @@
         </p:sp>
         <p:sp>
           <p:nvSpPr>
-            <p:cNvPr id="98" name="pt97"/>
+            <p:cNvPr id="104" name="pt103"/>
             <p:cNvSpPr/>
             <p:nvPr/>
           </p:nvSpPr>
@@ -6188,7 +6446,7 @@
         </p:sp>
         <p:sp>
           <p:nvSpPr>
-            <p:cNvPr id="99" name="pt98"/>
+            <p:cNvPr id="105" name="pt104"/>
             <p:cNvSpPr/>
             <p:nvPr/>
           </p:nvSpPr>
@@ -6223,7 +6481,7 @@
         </p:sp>
         <p:sp>
           <p:nvSpPr>
-            <p:cNvPr id="100" name="pt99"/>
+            <p:cNvPr id="106" name="pt105"/>
             <p:cNvSpPr/>
             <p:nvPr/>
           </p:nvSpPr>
@@ -6258,7 +6516,7 @@
         </p:sp>
         <p:sp>
           <p:nvSpPr>
-            <p:cNvPr id="101" name="pt100"/>
+            <p:cNvPr id="107" name="pt106"/>
             <p:cNvSpPr/>
             <p:nvPr/>
           </p:nvSpPr>
@@ -6293,7 +6551,7 @@
         </p:sp>
         <p:sp>
           <p:nvSpPr>
-            <p:cNvPr id="102" name="pt101"/>
+            <p:cNvPr id="108" name="pt107"/>
             <p:cNvSpPr/>
             <p:nvPr/>
           </p:nvSpPr>
@@ -6328,7 +6586,7 @@
         </p:sp>
         <p:sp>
           <p:nvSpPr>
-            <p:cNvPr id="103" name="pt102"/>
+            <p:cNvPr id="109" name="pt108"/>
             <p:cNvSpPr/>
             <p:nvPr/>
           </p:nvSpPr>
@@ -6363,7 +6621,7 @@
         </p:sp>
         <p:sp>
           <p:nvSpPr>
-            <p:cNvPr id="104" name="pt103"/>
+            <p:cNvPr id="110" name="pt109"/>
             <p:cNvSpPr/>
             <p:nvPr/>
           </p:nvSpPr>
@@ -6398,7 +6656,7 @@
         </p:sp>
         <p:sp>
           <p:nvSpPr>
-            <p:cNvPr id="105" name="pt104"/>
+            <p:cNvPr id="111" name="pt110"/>
             <p:cNvSpPr/>
             <p:nvPr/>
           </p:nvSpPr>
@@ -6433,7 +6691,7 @@
         </p:sp>
         <p:sp>
           <p:nvSpPr>
-            <p:cNvPr id="106" name="pt105"/>
+            <p:cNvPr id="112" name="pt111"/>
             <p:cNvSpPr/>
             <p:nvPr/>
           </p:nvSpPr>
@@ -6468,7 +6726,7 @@
         </p:sp>
         <p:sp>
           <p:nvSpPr>
-            <p:cNvPr id="107" name="pt106"/>
+            <p:cNvPr id="113" name="pt112"/>
             <p:cNvSpPr/>
             <p:nvPr/>
           </p:nvSpPr>
@@ -6503,7 +6761,7 @@
         </p:sp>
         <p:sp>
           <p:nvSpPr>
-            <p:cNvPr id="108" name="pt107"/>
+            <p:cNvPr id="114" name="pt113"/>
             <p:cNvSpPr/>
             <p:nvPr/>
           </p:nvSpPr>
@@ -6538,7 +6796,7 @@
         </p:sp>
         <p:sp>
           <p:nvSpPr>
-            <p:cNvPr id="109" name="pt108"/>
+            <p:cNvPr id="115" name="pt114"/>
             <p:cNvSpPr/>
             <p:nvPr/>
           </p:nvSpPr>
@@ -6573,7 +6831,7 @@
         </p:sp>
         <p:sp>
           <p:nvSpPr>
-            <p:cNvPr id="110" name="pt109"/>
+            <p:cNvPr id="116" name="pt115"/>
             <p:cNvSpPr/>
             <p:nvPr/>
           </p:nvSpPr>
@@ -6608,7 +6866,7 @@
         </p:sp>
         <p:sp>
           <p:nvSpPr>
-            <p:cNvPr id="111" name="pt110"/>
+            <p:cNvPr id="117" name="pt116"/>
             <p:cNvSpPr/>
             <p:nvPr/>
           </p:nvSpPr>
@@ -6643,7 +6901,7 @@
         </p:sp>
         <p:sp>
           <p:nvSpPr>
-            <p:cNvPr id="112" name="pt111"/>
+            <p:cNvPr id="118" name="pt117"/>
             <p:cNvSpPr/>
             <p:nvPr/>
           </p:nvSpPr>
@@ -6678,7 +6936,7 @@
         </p:sp>
         <p:sp>
           <p:nvSpPr>
-            <p:cNvPr id="113" name="pt112"/>
+            <p:cNvPr id="119" name="pt118"/>
             <p:cNvSpPr/>
             <p:nvPr/>
           </p:nvSpPr>
@@ -6713,7 +6971,7 @@
         </p:sp>
         <p:sp>
           <p:nvSpPr>
-            <p:cNvPr id="114" name="pt113"/>
+            <p:cNvPr id="120" name="pt119"/>
             <p:cNvSpPr/>
             <p:nvPr/>
           </p:nvSpPr>
@@ -6748,7 +7006,7 @@
         </p:sp>
         <p:sp>
           <p:nvSpPr>
-            <p:cNvPr id="115" name="pt114"/>
+            <p:cNvPr id="121" name="pt120"/>
             <p:cNvSpPr/>
             <p:nvPr/>
           </p:nvSpPr>
@@ -6783,7 +7041,7 @@
         </p:sp>
         <p:sp>
           <p:nvSpPr>
-            <p:cNvPr id="116" name="pt115"/>
+            <p:cNvPr id="122" name="pt121"/>
             <p:cNvSpPr/>
             <p:nvPr/>
           </p:nvSpPr>
@@ -6818,7 +7076,7 @@
         </p:sp>
         <p:sp>
           <p:nvSpPr>
-            <p:cNvPr id="117" name="pt116"/>
+            <p:cNvPr id="123" name="pt122"/>
             <p:cNvSpPr/>
             <p:nvPr/>
           </p:nvSpPr>
@@ -6853,7 +7111,7 @@
         </p:sp>
         <p:sp>
           <p:nvSpPr>
-            <p:cNvPr id="118" name="pt117"/>
+            <p:cNvPr id="124" name="pt123"/>
             <p:cNvSpPr/>
             <p:nvPr/>
           </p:nvSpPr>
@@ -6888,7 +7146,7 @@
         </p:sp>
         <p:sp>
           <p:nvSpPr>
-            <p:cNvPr id="119" name="pt118"/>
+            <p:cNvPr id="125" name="pt124"/>
             <p:cNvSpPr/>
             <p:nvPr/>
           </p:nvSpPr>
@@ -6923,7 +7181,7 @@
         </p:sp>
         <p:sp>
           <p:nvSpPr>
-            <p:cNvPr id="120" name="pt119"/>
+            <p:cNvPr id="126" name="pt125"/>
             <p:cNvSpPr/>
             <p:nvPr/>
           </p:nvSpPr>
@@ -6958,7 +7216,7 @@
         </p:sp>
         <p:sp>
           <p:nvSpPr>
-            <p:cNvPr id="121" name="pt120"/>
+            <p:cNvPr id="127" name="pt126"/>
             <p:cNvSpPr/>
             <p:nvPr/>
           </p:nvSpPr>
@@ -6993,7 +7251,7 @@
         </p:sp>
         <p:sp>
           <p:nvSpPr>
-            <p:cNvPr id="122" name="pt121"/>
+            <p:cNvPr id="128" name="pt127"/>
             <p:cNvSpPr/>
             <p:nvPr/>
           </p:nvSpPr>
@@ -7028,7 +7286,7 @@
         </p:sp>
         <p:sp>
           <p:nvSpPr>
-            <p:cNvPr id="123" name="pt122"/>
+            <p:cNvPr id="129" name="pt128"/>
             <p:cNvSpPr/>
             <p:nvPr/>
           </p:nvSpPr>
@@ -7063,7 +7321,7 @@
         </p:sp>
         <p:sp>
           <p:nvSpPr>
-            <p:cNvPr id="124" name="pt123"/>
+            <p:cNvPr id="130" name="pt129"/>
             <p:cNvSpPr/>
             <p:nvPr/>
           </p:nvSpPr>
@@ -7098,7 +7356,7 @@
         </p:sp>
         <p:sp>
           <p:nvSpPr>
-            <p:cNvPr id="125" name="pt124"/>
+            <p:cNvPr id="131" name="pt130"/>
             <p:cNvSpPr/>
             <p:nvPr/>
           </p:nvSpPr>
@@ -7133,7 +7391,7 @@
         </p:sp>
         <p:sp>
           <p:nvSpPr>
-            <p:cNvPr id="126" name="pt125"/>
+            <p:cNvPr id="132" name="pt131"/>
             <p:cNvSpPr/>
             <p:nvPr/>
           </p:nvSpPr>
@@ -7168,7 +7426,7 @@
         </p:sp>
         <p:sp>
           <p:nvSpPr>
-            <p:cNvPr id="127" name="pt126"/>
+            <p:cNvPr id="133" name="pt132"/>
             <p:cNvSpPr/>
             <p:nvPr/>
           </p:nvSpPr>
@@ -7203,7 +7461,7 @@
         </p:sp>
         <p:sp>
           <p:nvSpPr>
-            <p:cNvPr id="128" name="pt127"/>
+            <p:cNvPr id="134" name="pt133"/>
             <p:cNvSpPr/>
             <p:nvPr/>
           </p:nvSpPr>
@@ -7238,7 +7496,7 @@
         </p:sp>
         <p:sp>
           <p:nvSpPr>
-            <p:cNvPr id="129" name="pt128"/>
+            <p:cNvPr id="135" name="pt134"/>
             <p:cNvSpPr/>
             <p:nvPr/>
           </p:nvSpPr>
@@ -7273,7 +7531,7 @@
         </p:sp>
         <p:sp>
           <p:nvSpPr>
-            <p:cNvPr id="130" name="pt129"/>
+            <p:cNvPr id="136" name="pt135"/>
             <p:cNvSpPr/>
             <p:nvPr/>
           </p:nvSpPr>
@@ -7308,7 +7566,7 @@
         </p:sp>
         <p:sp>
           <p:nvSpPr>
-            <p:cNvPr id="131" name="pt130"/>
+            <p:cNvPr id="137" name="pt136"/>
             <p:cNvSpPr/>
             <p:nvPr/>
           </p:nvSpPr>
@@ -7343,7 +7601,7 @@
         </p:sp>
         <p:sp>
           <p:nvSpPr>
-            <p:cNvPr id="132" name="pt131"/>
+            <p:cNvPr id="138" name="pt137"/>
             <p:cNvSpPr/>
             <p:nvPr/>
           </p:nvSpPr>
@@ -7378,7 +7636,7 @@
         </p:sp>
         <p:sp>
           <p:nvSpPr>
-            <p:cNvPr id="133" name="pt132"/>
+            <p:cNvPr id="139" name="pt138"/>
             <p:cNvSpPr/>
             <p:nvPr/>
           </p:nvSpPr>
@@ -7413,7 +7671,7 @@
         </p:sp>
         <p:sp>
           <p:nvSpPr>
-            <p:cNvPr id="134" name="pt133"/>
+            <p:cNvPr id="140" name="pt139"/>
             <p:cNvSpPr/>
             <p:nvPr/>
           </p:nvSpPr>
@@ -7448,7 +7706,7 @@
         </p:sp>
         <p:sp>
           <p:nvSpPr>
-            <p:cNvPr id="135" name="pt134"/>
+            <p:cNvPr id="141" name="pt140"/>
             <p:cNvSpPr/>
             <p:nvPr/>
           </p:nvSpPr>
@@ -7483,7 +7741,7 @@
         </p:sp>
         <p:sp>
           <p:nvSpPr>
-            <p:cNvPr id="136" name="pt135"/>
+            <p:cNvPr id="142" name="pt141"/>
             <p:cNvSpPr/>
             <p:nvPr/>
           </p:nvSpPr>
@@ -7518,7 +7776,7 @@
         </p:sp>
         <p:sp>
           <p:nvSpPr>
-            <p:cNvPr id="137" name="pt136"/>
+            <p:cNvPr id="143" name="pt142"/>
             <p:cNvSpPr/>
             <p:nvPr/>
           </p:nvSpPr>
@@ -7553,7 +7811,7 @@
         </p:sp>
         <p:sp>
           <p:nvSpPr>
-            <p:cNvPr id="138" name="pt137"/>
+            <p:cNvPr id="144" name="pt143"/>
             <p:cNvSpPr/>
             <p:nvPr/>
           </p:nvSpPr>
@@ -7588,7 +7846,7 @@
         </p:sp>
         <p:sp>
           <p:nvSpPr>
-            <p:cNvPr id="139" name="pt138"/>
+            <p:cNvPr id="145" name="pt144"/>
             <p:cNvSpPr/>
             <p:nvPr/>
           </p:nvSpPr>
@@ -7623,7 +7881,7 @@
         </p:sp>
         <p:sp>
           <p:nvSpPr>
-            <p:cNvPr id="140" name="pt139"/>
+            <p:cNvPr id="146" name="pt145"/>
             <p:cNvSpPr/>
             <p:nvPr/>
           </p:nvSpPr>
@@ -7658,7 +7916,7 @@
         </p:sp>
         <p:sp>
           <p:nvSpPr>
-            <p:cNvPr id="141" name="pt140"/>
+            <p:cNvPr id="147" name="pt146"/>
             <p:cNvSpPr/>
             <p:nvPr/>
           </p:nvSpPr>
@@ -7693,7 +7951,7 @@
         </p:sp>
         <p:sp>
           <p:nvSpPr>
-            <p:cNvPr id="142" name="pt141"/>
+            <p:cNvPr id="148" name="pt147"/>
             <p:cNvSpPr/>
             <p:nvPr/>
           </p:nvSpPr>
@@ -7728,7 +7986,7 @@
         </p:sp>
         <p:sp>
           <p:nvSpPr>
-            <p:cNvPr id="143" name="pt142"/>
+            <p:cNvPr id="149" name="pt148"/>
             <p:cNvSpPr/>
             <p:nvPr/>
           </p:nvSpPr>
@@ -7763,7 +8021,7 @@
         </p:sp>
         <p:sp>
           <p:nvSpPr>
-            <p:cNvPr id="144" name="pt143"/>
+            <p:cNvPr id="150" name="pt149"/>
             <p:cNvSpPr/>
             <p:nvPr/>
           </p:nvSpPr>
@@ -7798,7 +8056,7 @@
         </p:sp>
         <p:sp>
           <p:nvSpPr>
-            <p:cNvPr id="145" name="pt144"/>
+            <p:cNvPr id="151" name="pt150"/>
             <p:cNvSpPr/>
             <p:nvPr/>
           </p:nvSpPr>
@@ -7833,7 +8091,7 @@
         </p:sp>
         <p:sp>
           <p:nvSpPr>
-            <p:cNvPr id="146" name="pt145"/>
+            <p:cNvPr id="152" name="pt151"/>
             <p:cNvSpPr/>
             <p:nvPr/>
           </p:nvSpPr>
@@ -7868,7 +8126,7 @@
         </p:sp>
         <p:sp>
           <p:nvSpPr>
-            <p:cNvPr id="147" name="pt146"/>
+            <p:cNvPr id="153" name="pt152"/>
             <p:cNvSpPr/>
             <p:nvPr/>
           </p:nvSpPr>
@@ -7903,7 +8161,7 @@
         </p:sp>
         <p:sp>
           <p:nvSpPr>
-            <p:cNvPr id="148" name="pt147"/>
+            <p:cNvPr id="154" name="pt153"/>
             <p:cNvSpPr/>
             <p:nvPr/>
           </p:nvSpPr>
@@ -7938,7 +8196,7 @@
         </p:sp>
         <p:sp>
           <p:nvSpPr>
-            <p:cNvPr id="149" name="pt148"/>
+            <p:cNvPr id="155" name="pt154"/>
             <p:cNvSpPr/>
             <p:nvPr/>
           </p:nvSpPr>
@@ -7973,7 +8231,7 @@
         </p:sp>
         <p:sp>
           <p:nvSpPr>
-            <p:cNvPr id="150" name="pt149"/>
+            <p:cNvPr id="156" name="pt155"/>
             <p:cNvSpPr/>
             <p:nvPr/>
           </p:nvSpPr>
@@ -8008,7 +8266,7 @@
         </p:sp>
         <p:sp>
           <p:nvSpPr>
-            <p:cNvPr id="151" name="pt150"/>
+            <p:cNvPr id="157" name="pt156"/>
             <p:cNvSpPr/>
             <p:nvPr/>
           </p:nvSpPr>
@@ -8043,7 +8301,7 @@
         </p:sp>
         <p:sp>
           <p:nvSpPr>
-            <p:cNvPr id="152" name="pt151"/>
+            <p:cNvPr id="158" name="pt157"/>
             <p:cNvSpPr/>
             <p:nvPr/>
           </p:nvSpPr>
@@ -8078,7 +8336,7 @@
         </p:sp>
         <p:sp>
           <p:nvSpPr>
-            <p:cNvPr id="153" name="pt152"/>
+            <p:cNvPr id="159" name="pt158"/>
             <p:cNvSpPr/>
             <p:nvPr/>
           </p:nvSpPr>
@@ -8113,7 +8371,7 @@
         </p:sp>
         <p:sp>
           <p:nvSpPr>
-            <p:cNvPr id="154" name="tx153"/>
+            <p:cNvPr id="160" name="tx159"/>
             <p:cNvSpPr/>
             <p:nvPr/>
           </p:nvSpPr>
@@ -8159,7 +8417,7 @@
         </p:sp>
         <p:sp>
           <p:nvSpPr>
-            <p:cNvPr id="155" name="tx154"/>
+            <p:cNvPr id="161" name="tx160"/>
             <p:cNvSpPr/>
             <p:nvPr/>
           </p:nvSpPr>
@@ -8205,7 +8463,7 @@
         </p:sp>
         <p:sp>
           <p:nvSpPr>
-            <p:cNvPr id="156" name="tx155"/>
+            <p:cNvPr id="162" name="tx161"/>
             <p:cNvSpPr/>
             <p:nvPr/>
           </p:nvSpPr>
@@ -8251,7 +8509,7 @@
         </p:sp>
         <p:sp>
           <p:nvSpPr>
-            <p:cNvPr id="157" name="tx156"/>
+            <p:cNvPr id="163" name="tx162"/>
             <p:cNvSpPr/>
             <p:nvPr/>
           </p:nvSpPr>
@@ -8297,7 +8555,7 @@
         </p:sp>
         <p:sp>
           <p:nvSpPr>
-            <p:cNvPr id="158" name="tx157"/>
+            <p:cNvPr id="164" name="tx163"/>
             <p:cNvSpPr/>
             <p:nvPr/>
           </p:nvSpPr>
@@ -8343,7 +8601,7 @@
         </p:sp>
         <p:sp>
           <p:nvSpPr>
-            <p:cNvPr id="159" name="tx158"/>
+            <p:cNvPr id="165" name="tx164"/>
             <p:cNvSpPr/>
             <p:nvPr/>
           </p:nvSpPr>
@@ -8389,7 +8647,7 @@
         </p:sp>
         <p:sp>
           <p:nvSpPr>
-            <p:cNvPr id="160" name="tx159"/>
+            <p:cNvPr id="166" name="tx165"/>
             <p:cNvSpPr/>
             <p:nvPr/>
           </p:nvSpPr>
@@ -8435,7 +8693,7 @@
         </p:sp>
         <p:sp>
           <p:nvSpPr>
-            <p:cNvPr id="161" name="pl160"/>
+            <p:cNvPr id="167" name="pl166"/>
             <p:cNvSpPr/>
             <p:nvPr/>
           </p:nvSpPr>
@@ -8475,7 +8733,7 @@
         </p:sp>
         <p:sp>
           <p:nvSpPr>
-            <p:cNvPr id="162" name="pl161"/>
+            <p:cNvPr id="168" name="pl167"/>
             <p:cNvSpPr/>
             <p:nvPr/>
           </p:nvSpPr>
@@ -8515,7 +8773,7 @@
         </p:sp>
         <p:sp>
           <p:nvSpPr>
-            <p:cNvPr id="163" name="pl162"/>
+            <p:cNvPr id="169" name="pl168"/>
             <p:cNvSpPr/>
             <p:nvPr/>
           </p:nvSpPr>
@@ -8555,7 +8813,7 @@
         </p:sp>
         <p:sp>
           <p:nvSpPr>
-            <p:cNvPr id="164" name="pl163"/>
+            <p:cNvPr id="170" name="pl169"/>
             <p:cNvSpPr/>
             <p:nvPr/>
           </p:nvSpPr>
@@ -8595,7 +8853,7 @@
         </p:sp>
         <p:sp>
           <p:nvSpPr>
-            <p:cNvPr id="165" name="pl164"/>
+            <p:cNvPr id="171" name="pl170"/>
             <p:cNvSpPr/>
             <p:nvPr/>
           </p:nvSpPr>
@@ -8635,7 +8893,7 @@
         </p:sp>
         <p:sp>
           <p:nvSpPr>
-            <p:cNvPr id="166" name="pl165"/>
+            <p:cNvPr id="172" name="pl171"/>
             <p:cNvSpPr/>
             <p:nvPr/>
           </p:nvSpPr>
@@ -8675,7 +8933,7 @@
         </p:sp>
         <p:sp>
           <p:nvSpPr>
-            <p:cNvPr id="167" name="pl166"/>
+            <p:cNvPr id="173" name="pl172"/>
             <p:cNvSpPr/>
             <p:nvPr/>
           </p:nvSpPr>
@@ -8715,7 +8973,7 @@
         </p:sp>
         <p:sp>
           <p:nvSpPr>
-            <p:cNvPr id="168" name="pl167"/>
+            <p:cNvPr id="174" name="pl173"/>
             <p:cNvSpPr/>
             <p:nvPr/>
           </p:nvSpPr>
@@ -8755,13 +9013,13 @@
         </p:sp>
         <p:sp>
           <p:nvSpPr>
-            <p:cNvPr id="169" name="pl168"/>
-            <p:cNvSpPr/>
-            <p:nvPr/>
-          </p:nvSpPr>
-          <p:spPr>
-            <a:xfrm>
-              <a:off x="2033973" y="4172066"/>
+            <p:cNvPr id="175" name="pl174"/>
+            <p:cNvSpPr/>
+            <p:nvPr/>
+          </p:nvSpPr>
+          <p:spPr>
+            <a:xfrm>
+              <a:off x="1963390" y="4172066"/>
               <a:ext cx="0" cy="34794"/>
             </a:xfrm>
             <a:custGeom>
@@ -8795,13 +9053,13 @@
         </p:sp>
         <p:sp>
           <p:nvSpPr>
-            <p:cNvPr id="170" name="pl169"/>
-            <p:cNvSpPr/>
-            <p:nvPr/>
-          </p:nvSpPr>
-          <p:spPr>
-            <a:xfrm>
-              <a:off x="2386887" y="4172066"/>
+            <p:cNvPr id="176" name="pl175"/>
+            <p:cNvSpPr/>
+            <p:nvPr/>
+          </p:nvSpPr>
+          <p:spPr>
+            <a:xfrm>
+              <a:off x="2245721" y="4172066"/>
               <a:ext cx="0" cy="34794"/>
             </a:xfrm>
             <a:custGeom>
@@ -8835,13 +9093,13 @@
         </p:sp>
         <p:sp>
           <p:nvSpPr>
-            <p:cNvPr id="171" name="pl170"/>
-            <p:cNvSpPr/>
-            <p:nvPr/>
-          </p:nvSpPr>
-          <p:spPr>
-            <a:xfrm>
-              <a:off x="2739800" y="4172066"/>
+            <p:cNvPr id="177" name="pl176"/>
+            <p:cNvSpPr/>
+            <p:nvPr/>
+          </p:nvSpPr>
+          <p:spPr>
+            <a:xfrm>
+              <a:off x="2528052" y="4172066"/>
               <a:ext cx="0" cy="34794"/>
             </a:xfrm>
             <a:custGeom>
@@ -8875,13 +9133,13 @@
         </p:sp>
         <p:sp>
           <p:nvSpPr>
-            <p:cNvPr id="172" name="pl171"/>
-            <p:cNvSpPr/>
-            <p:nvPr/>
-          </p:nvSpPr>
-          <p:spPr>
-            <a:xfrm>
-              <a:off x="3092714" y="4172066"/>
+            <p:cNvPr id="178" name="pl177"/>
+            <p:cNvSpPr/>
+            <p:nvPr/>
+          </p:nvSpPr>
+          <p:spPr>
+            <a:xfrm>
+              <a:off x="2810383" y="4172066"/>
               <a:ext cx="0" cy="34794"/>
             </a:xfrm>
             <a:custGeom>
@@ -8915,13 +9173,13 @@
         </p:sp>
         <p:sp>
           <p:nvSpPr>
-            <p:cNvPr id="173" name="pl172"/>
-            <p:cNvSpPr/>
-            <p:nvPr/>
-          </p:nvSpPr>
-          <p:spPr>
-            <a:xfrm>
-              <a:off x="3445627" y="4172066"/>
+            <p:cNvPr id="179" name="pl178"/>
+            <p:cNvSpPr/>
+            <p:nvPr/>
+          </p:nvSpPr>
+          <p:spPr>
+            <a:xfrm>
+              <a:off x="3092714" y="4172066"/>
               <a:ext cx="0" cy="34794"/>
             </a:xfrm>
             <a:custGeom>
@@ -8955,13 +9213,13 @@
         </p:sp>
         <p:sp>
           <p:nvSpPr>
-            <p:cNvPr id="174" name="pl173"/>
-            <p:cNvSpPr/>
-            <p:nvPr/>
-          </p:nvSpPr>
-          <p:spPr>
-            <a:xfrm>
-              <a:off x="3798541" y="4172066"/>
+            <p:cNvPr id="180" name="pl179"/>
+            <p:cNvSpPr/>
+            <p:nvPr/>
+          </p:nvSpPr>
+          <p:spPr>
+            <a:xfrm>
+              <a:off x="3375045" y="4172066"/>
               <a:ext cx="0" cy="34794"/>
             </a:xfrm>
             <a:custGeom>
@@ -8995,13 +9253,13 @@
         </p:sp>
         <p:sp>
           <p:nvSpPr>
-            <p:cNvPr id="175" name="pl174"/>
-            <p:cNvSpPr/>
-            <p:nvPr/>
-          </p:nvSpPr>
-          <p:spPr>
-            <a:xfrm>
-              <a:off x="4151455" y="4172066"/>
+            <p:cNvPr id="181" name="pl180"/>
+            <p:cNvSpPr/>
+            <p:nvPr/>
+          </p:nvSpPr>
+          <p:spPr>
+            <a:xfrm>
+              <a:off x="3657376" y="4172066"/>
               <a:ext cx="0" cy="34794"/>
             </a:xfrm>
             <a:custGeom>
@@ -9035,13 +9293,13 @@
         </p:sp>
         <p:sp>
           <p:nvSpPr>
-            <p:cNvPr id="176" name="pl175"/>
-            <p:cNvSpPr/>
-            <p:nvPr/>
-          </p:nvSpPr>
-          <p:spPr>
-            <a:xfrm>
-              <a:off x="4504368" y="4172066"/>
+            <p:cNvPr id="182" name="pl181"/>
+            <p:cNvSpPr/>
+            <p:nvPr/>
+          </p:nvSpPr>
+          <p:spPr>
+            <a:xfrm>
+              <a:off x="3939706" y="4172066"/>
               <a:ext cx="0" cy="34794"/>
             </a:xfrm>
             <a:custGeom>
@@ -9075,13 +9333,13 @@
         </p:sp>
         <p:sp>
           <p:nvSpPr>
-            <p:cNvPr id="177" name="pl176"/>
-            <p:cNvSpPr/>
-            <p:nvPr/>
-          </p:nvSpPr>
-          <p:spPr>
-            <a:xfrm>
-              <a:off x="4857282" y="4172066"/>
+            <p:cNvPr id="183" name="pl182"/>
+            <p:cNvSpPr/>
+            <p:nvPr/>
+          </p:nvSpPr>
+          <p:spPr>
+            <a:xfrm>
+              <a:off x="4222037" y="4172066"/>
               <a:ext cx="0" cy="34794"/>
             </a:xfrm>
             <a:custGeom>
@@ -9115,13 +9373,13 @@
         </p:sp>
         <p:sp>
           <p:nvSpPr>
-            <p:cNvPr id="178" name="pl177"/>
-            <p:cNvSpPr/>
-            <p:nvPr/>
-          </p:nvSpPr>
-          <p:spPr>
-            <a:xfrm>
-              <a:off x="5210196" y="4172066"/>
+            <p:cNvPr id="184" name="pl183"/>
+            <p:cNvSpPr/>
+            <p:nvPr/>
+          </p:nvSpPr>
+          <p:spPr>
+            <a:xfrm>
+              <a:off x="4504368" y="4172066"/>
               <a:ext cx="0" cy="34794"/>
             </a:xfrm>
             <a:custGeom>
@@ -9155,13 +9413,13 @@
         </p:sp>
         <p:sp>
           <p:nvSpPr>
-            <p:cNvPr id="179" name="pl178"/>
-            <p:cNvSpPr/>
-            <p:nvPr/>
-          </p:nvSpPr>
-          <p:spPr>
-            <a:xfrm>
-              <a:off x="5563109" y="4172066"/>
+            <p:cNvPr id="185" name="pl184"/>
+            <p:cNvSpPr/>
+            <p:nvPr/>
+          </p:nvSpPr>
+          <p:spPr>
+            <a:xfrm>
+              <a:off x="4786699" y="4172066"/>
               <a:ext cx="0" cy="34794"/>
             </a:xfrm>
             <a:custGeom>
@@ -9195,7 +9453,127 @@
         </p:sp>
         <p:sp>
           <p:nvSpPr>
-            <p:cNvPr id="180" name="tx179"/>
+            <p:cNvPr id="186" name="pl185"/>
+            <p:cNvSpPr/>
+            <p:nvPr/>
+          </p:nvSpPr>
+          <p:spPr>
+            <a:xfrm>
+              <a:off x="5069030" y="4172066"/>
+              <a:ext cx="0" cy="34794"/>
+            </a:xfrm>
+            <a:custGeom>
+              <a:avLst/>
+              <a:pathLst>
+                <a:path w="0" h="34794">
+                  <a:moveTo>
+                    <a:pt x="0" y="34794"/>
+                  </a:moveTo>
+                  <a:lnTo>
+                    <a:pt x="0" y="0"/>
+                  </a:lnTo>
+                </a:path>
+              </a:pathLst>
+            </a:custGeom>
+            <a:ln w="13550" cap="flat">
+              <a:solidFill>
+                <a:srgbClr val="333333">
+                  <a:alpha val="100000"/>
+                </a:srgbClr>
+              </a:solidFill>
+              <a:prstDash val="solid"/>
+              <a:round/>
+            </a:ln>
+          </p:spPr>
+          <p:txBody>
+            <a:bodyPr/>
+            <a:lstStyle/>
+            <a:p/>
+          </p:txBody>
+        </p:sp>
+        <p:sp>
+          <p:nvSpPr>
+            <p:cNvPr id="187" name="pl186"/>
+            <p:cNvSpPr/>
+            <p:nvPr/>
+          </p:nvSpPr>
+          <p:spPr>
+            <a:xfrm>
+              <a:off x="5351361" y="4172066"/>
+              <a:ext cx="0" cy="34794"/>
+            </a:xfrm>
+            <a:custGeom>
+              <a:avLst/>
+              <a:pathLst>
+                <a:path w="0" h="34794">
+                  <a:moveTo>
+                    <a:pt x="0" y="34794"/>
+                  </a:moveTo>
+                  <a:lnTo>
+                    <a:pt x="0" y="0"/>
+                  </a:lnTo>
+                </a:path>
+              </a:pathLst>
+            </a:custGeom>
+            <a:ln w="13550" cap="flat">
+              <a:solidFill>
+                <a:srgbClr val="333333">
+                  <a:alpha val="100000"/>
+                </a:srgbClr>
+              </a:solidFill>
+              <a:prstDash val="solid"/>
+              <a:round/>
+            </a:ln>
+          </p:spPr>
+          <p:txBody>
+            <a:bodyPr/>
+            <a:lstStyle/>
+            <a:p/>
+          </p:txBody>
+        </p:sp>
+        <p:sp>
+          <p:nvSpPr>
+            <p:cNvPr id="188" name="pl187"/>
+            <p:cNvSpPr/>
+            <p:nvPr/>
+          </p:nvSpPr>
+          <p:spPr>
+            <a:xfrm>
+              <a:off x="5633692" y="4172066"/>
+              <a:ext cx="0" cy="34794"/>
+            </a:xfrm>
+            <a:custGeom>
+              <a:avLst/>
+              <a:pathLst>
+                <a:path w="0" h="34794">
+                  <a:moveTo>
+                    <a:pt x="0" y="34794"/>
+                  </a:moveTo>
+                  <a:lnTo>
+                    <a:pt x="0" y="0"/>
+                  </a:lnTo>
+                </a:path>
+              </a:pathLst>
+            </a:custGeom>
+            <a:ln w="13550" cap="flat">
+              <a:solidFill>
+                <a:srgbClr val="333333">
+                  <a:alpha val="100000"/>
+                </a:srgbClr>
+              </a:solidFill>
+              <a:prstDash val="solid"/>
+              <a:round/>
+            </a:ln>
+          </p:spPr>
+          <p:txBody>
+            <a:bodyPr/>
+            <a:lstStyle/>
+            <a:p/>
+          </p:txBody>
+        </p:sp>
+        <p:sp>
+          <p:nvSpPr>
+            <p:cNvPr id="189" name="tx188"/>
             <p:cNvSpPr/>
             <p:nvPr/>
           </p:nvSpPr>
@@ -9241,14 +9619,14 @@
         </p:sp>
         <p:sp>
           <p:nvSpPr>
-            <p:cNvPr id="181" name="tx180"/>
-            <p:cNvSpPr/>
-            <p:nvPr/>
-          </p:nvSpPr>
-          <p:spPr>
-            <a:xfrm>
-              <a:off x="2002895" y="4234423"/>
-              <a:ext cx="62155" cy="80272"/>
+            <p:cNvPr id="190" name="tx189"/>
+            <p:cNvSpPr/>
+            <p:nvPr/>
+          </p:nvSpPr>
+          <p:spPr>
+            <a:xfrm>
+              <a:off x="1932312" y="4234696"/>
+              <a:ext cx="62155" cy="80000"/>
             </a:xfrm>
             <a:prstGeom prst="rect">
               <a:avLst/>
@@ -9280,21 +9658,21 @@
                   <a:latin typeface="Arial"/>
                   <a:cs typeface="Arial"/>
                 </a:rPr>
-                <a:t>5</a:t>
+                <a:t>4</a:t>
               </a:r>
             </a:p>
           </p:txBody>
         </p:sp>
         <p:sp>
           <p:nvSpPr>
-            <p:cNvPr id="182" name="tx181"/>
-            <p:cNvSpPr/>
-            <p:nvPr/>
-          </p:nvSpPr>
-          <p:spPr>
-            <a:xfrm>
-              <a:off x="2324731" y="4233005"/>
-              <a:ext cx="124311" cy="81691"/>
+            <p:cNvPr id="191" name="tx190"/>
+            <p:cNvSpPr/>
+            <p:nvPr/>
+          </p:nvSpPr>
+          <p:spPr>
+            <a:xfrm>
+              <a:off x="2214643" y="4233005"/>
+              <a:ext cx="62155" cy="81691"/>
             </a:xfrm>
             <a:prstGeom prst="rect">
               <a:avLst/>
@@ -9326,21 +9704,21 @@
                   <a:latin typeface="Arial"/>
                   <a:cs typeface="Arial"/>
                 </a:rPr>
-                <a:t>10</a:t>
+                <a:t>8</a:t>
               </a:r>
             </a:p>
           </p:txBody>
         </p:sp>
         <p:sp>
           <p:nvSpPr>
-            <p:cNvPr id="183" name="tx182"/>
-            <p:cNvSpPr/>
-            <p:nvPr/>
-          </p:nvSpPr>
-          <p:spPr>
-            <a:xfrm>
-              <a:off x="2677645" y="4233005"/>
-              <a:ext cx="124311" cy="81691"/>
+            <p:cNvPr id="192" name="tx191"/>
+            <p:cNvSpPr/>
+            <p:nvPr/>
+          </p:nvSpPr>
+          <p:spPr>
+            <a:xfrm>
+              <a:off x="2465896" y="4234369"/>
+              <a:ext cx="124311" cy="80327"/>
             </a:xfrm>
             <a:prstGeom prst="rect">
               <a:avLst/>
@@ -9372,14 +9750,60 @@
                   <a:latin typeface="Arial"/>
                   <a:cs typeface="Arial"/>
                 </a:rPr>
-                <a:t>15</a:t>
+                <a:t>12</a:t>
               </a:r>
             </a:p>
           </p:txBody>
         </p:sp>
         <p:sp>
           <p:nvSpPr>
-            <p:cNvPr id="184" name="tx183"/>
+            <p:cNvPr id="193" name="tx192"/>
+            <p:cNvSpPr/>
+            <p:nvPr/>
+          </p:nvSpPr>
+          <p:spPr>
+            <a:xfrm>
+              <a:off x="2748227" y="4233005"/>
+              <a:ext cx="124311" cy="81691"/>
+            </a:xfrm>
+            <a:prstGeom prst="rect">
+              <a:avLst/>
+            </a:prstGeom>
+            <a:noFill/>
+          </p:spPr>
+          <p:txBody>
+            <a:bodyPr lIns="0" rIns="0" tIns="0" bIns="0" anchorCtr="1" anchor="ctr" wrap="none"/>
+            <a:lstStyle/>
+            <a:p>
+              <a:pPr algn="l" marL="0" marR="0" indent="0">
+                <a:lnSpc>
+                  <a:spcPts val="880"/>
+                </a:lnSpc>
+                <a:spcBef>
+                  <a:spcPts val="0"/>
+                </a:spcBef>
+                <a:spcAft>
+                  <a:spcPts val="0"/>
+                </a:spcAft>
+              </a:pPr>
+              <a:r>
+                <a:rPr sz="880">
+                  <a:solidFill>
+                    <a:srgbClr val="4D4D4D">
+                      <a:alpha val="100000"/>
+                    </a:srgbClr>
+                  </a:solidFill>
+                  <a:latin typeface="Arial"/>
+                  <a:cs typeface="Arial"/>
+                </a:rPr>
+                <a:t>16</a:t>
+              </a:r>
+            </a:p>
+          </p:txBody>
+        </p:sp>
+        <p:sp>
+          <p:nvSpPr>
+            <p:cNvPr id="194" name="tx193"/>
             <p:cNvSpPr/>
             <p:nvPr/>
           </p:nvSpPr>
@@ -9425,14 +9849,14 @@
         </p:sp>
         <p:sp>
           <p:nvSpPr>
-            <p:cNvPr id="185" name="tx184"/>
-            <p:cNvSpPr/>
-            <p:nvPr/>
-          </p:nvSpPr>
-          <p:spPr>
-            <a:xfrm>
-              <a:off x="3383472" y="4233005"/>
-              <a:ext cx="124311" cy="81691"/>
+            <p:cNvPr id="195" name="tx194"/>
+            <p:cNvSpPr/>
+            <p:nvPr/>
+          </p:nvSpPr>
+          <p:spPr>
+            <a:xfrm>
+              <a:off x="3312889" y="4234369"/>
+              <a:ext cx="124311" cy="80327"/>
             </a:xfrm>
             <a:prstGeom prst="rect">
               <a:avLst/>
@@ -9464,21 +9888,21 @@
                   <a:latin typeface="Arial"/>
                   <a:cs typeface="Arial"/>
                 </a:rPr>
-                <a:t>25</a:t>
+                <a:t>24</a:t>
               </a:r>
             </a:p>
           </p:txBody>
         </p:sp>
         <p:sp>
           <p:nvSpPr>
-            <p:cNvPr id="186" name="tx185"/>
-            <p:cNvSpPr/>
-            <p:nvPr/>
-          </p:nvSpPr>
-          <p:spPr>
-            <a:xfrm>
-              <a:off x="3736385" y="4232950"/>
-              <a:ext cx="124311" cy="81746"/>
+            <p:cNvPr id="196" name="tx195"/>
+            <p:cNvSpPr/>
+            <p:nvPr/>
+          </p:nvSpPr>
+          <p:spPr>
+            <a:xfrm>
+              <a:off x="3595220" y="4233005"/>
+              <a:ext cx="124311" cy="81691"/>
             </a:xfrm>
             <a:prstGeom prst="rect">
               <a:avLst/>
@@ -9510,20 +9934,20 @@
                   <a:latin typeface="Arial"/>
                   <a:cs typeface="Arial"/>
                 </a:rPr>
-                <a:t>30</a:t>
+                <a:t>28</a:t>
               </a:r>
             </a:p>
           </p:txBody>
         </p:sp>
         <p:sp>
           <p:nvSpPr>
-            <p:cNvPr id="187" name="tx186"/>
-            <p:cNvSpPr/>
-            <p:nvPr/>
-          </p:nvSpPr>
-          <p:spPr>
-            <a:xfrm>
-              <a:off x="4089299" y="4232950"/>
+            <p:cNvPr id="197" name="tx196"/>
+            <p:cNvSpPr/>
+            <p:nvPr/>
+          </p:nvSpPr>
+          <p:spPr>
+            <a:xfrm>
+              <a:off x="3877551" y="4232950"/>
               <a:ext cx="124311" cy="81746"/>
             </a:xfrm>
             <a:prstGeom prst="rect">
@@ -9556,14 +9980,60 @@
                   <a:latin typeface="Arial"/>
                   <a:cs typeface="Arial"/>
                 </a:rPr>
-                <a:t>35</a:t>
+                <a:t>32</a:t>
               </a:r>
             </a:p>
           </p:txBody>
         </p:sp>
         <p:sp>
           <p:nvSpPr>
-            <p:cNvPr id="188" name="tx187"/>
+            <p:cNvPr id="198" name="tx197"/>
+            <p:cNvSpPr/>
+            <p:nvPr/>
+          </p:nvSpPr>
+          <p:spPr>
+            <a:xfrm>
+              <a:off x="4159882" y="4232950"/>
+              <a:ext cx="124311" cy="81746"/>
+            </a:xfrm>
+            <a:prstGeom prst="rect">
+              <a:avLst/>
+            </a:prstGeom>
+            <a:noFill/>
+          </p:spPr>
+          <p:txBody>
+            <a:bodyPr lIns="0" rIns="0" tIns="0" bIns="0" anchorCtr="1" anchor="ctr" wrap="none"/>
+            <a:lstStyle/>
+            <a:p>
+              <a:pPr algn="l" marL="0" marR="0" indent="0">
+                <a:lnSpc>
+                  <a:spcPts val="880"/>
+                </a:lnSpc>
+                <a:spcBef>
+                  <a:spcPts val="0"/>
+                </a:spcBef>
+                <a:spcAft>
+                  <a:spcPts val="0"/>
+                </a:spcAft>
+              </a:pPr>
+              <a:r>
+                <a:rPr sz="880">
+                  <a:solidFill>
+                    <a:srgbClr val="4D4D4D">
+                      <a:alpha val="100000"/>
+                    </a:srgbClr>
+                  </a:solidFill>
+                  <a:latin typeface="Arial"/>
+                  <a:cs typeface="Arial"/>
+                </a:rPr>
+                <a:t>36</a:t>
+              </a:r>
+            </a:p>
+          </p:txBody>
+        </p:sp>
+        <p:sp>
+          <p:nvSpPr>
+            <p:cNvPr id="199" name="tx198"/>
             <p:cNvSpPr/>
             <p:nvPr/>
           </p:nvSpPr>
@@ -9609,14 +10079,14 @@
         </p:sp>
         <p:sp>
           <p:nvSpPr>
-            <p:cNvPr id="189" name="tx188"/>
-            <p:cNvSpPr/>
-            <p:nvPr/>
-          </p:nvSpPr>
-          <p:spPr>
-            <a:xfrm>
-              <a:off x="4795126" y="4233332"/>
-              <a:ext cx="124311" cy="81364"/>
+            <p:cNvPr id="200" name="tx199"/>
+            <p:cNvSpPr/>
+            <p:nvPr/>
+          </p:nvSpPr>
+          <p:spPr>
+            <a:xfrm>
+              <a:off x="4724544" y="4234696"/>
+              <a:ext cx="124311" cy="80000"/>
             </a:xfrm>
             <a:prstGeom prst="rect">
               <a:avLst/>
@@ -9648,20 +10118,20 @@
                   <a:latin typeface="Arial"/>
                   <a:cs typeface="Arial"/>
                 </a:rPr>
-                <a:t>45</a:t>
+                <a:t>44</a:t>
               </a:r>
             </a:p>
           </p:txBody>
         </p:sp>
         <p:sp>
           <p:nvSpPr>
-            <p:cNvPr id="190" name="tx189"/>
-            <p:cNvSpPr/>
-            <p:nvPr/>
-          </p:nvSpPr>
-          <p:spPr>
-            <a:xfrm>
-              <a:off x="5148040" y="4233005"/>
+            <p:cNvPr id="201" name="tx200"/>
+            <p:cNvSpPr/>
+            <p:nvPr/>
+          </p:nvSpPr>
+          <p:spPr>
+            <a:xfrm>
+              <a:off x="5006874" y="4233005"/>
               <a:ext cx="124311" cy="81691"/>
             </a:xfrm>
             <a:prstGeom prst="rect">
@@ -9694,21 +10164,21 @@
                   <a:latin typeface="Arial"/>
                   <a:cs typeface="Arial"/>
                 </a:rPr>
-                <a:t>50</a:t>
+                <a:t>48</a:t>
               </a:r>
             </a:p>
           </p:txBody>
         </p:sp>
         <p:sp>
           <p:nvSpPr>
-            <p:cNvPr id="191" name="tx190"/>
-            <p:cNvSpPr/>
-            <p:nvPr/>
-          </p:nvSpPr>
-          <p:spPr>
-            <a:xfrm>
-              <a:off x="5500954" y="4234423"/>
-              <a:ext cx="124311" cy="80272"/>
+            <p:cNvPr id="202" name="tx201"/>
+            <p:cNvSpPr/>
+            <p:nvPr/>
+          </p:nvSpPr>
+          <p:spPr>
+            <a:xfrm>
+              <a:off x="5289205" y="4233005"/>
+              <a:ext cx="124311" cy="81691"/>
             </a:xfrm>
             <a:prstGeom prst="rect">
               <a:avLst/>
@@ -9740,14 +10210,60 @@
                   <a:latin typeface="Arial"/>
                   <a:cs typeface="Arial"/>
                 </a:rPr>
-                <a:t>55</a:t>
+                <a:t>52</a:t>
               </a:r>
             </a:p>
           </p:txBody>
         </p:sp>
         <p:sp>
           <p:nvSpPr>
-            <p:cNvPr id="192" name="tx191"/>
+            <p:cNvPr id="203" name="tx202"/>
+            <p:cNvSpPr/>
+            <p:nvPr/>
+          </p:nvSpPr>
+          <p:spPr>
+            <a:xfrm>
+              <a:off x="5571536" y="4233005"/>
+              <a:ext cx="124311" cy="81691"/>
+            </a:xfrm>
+            <a:prstGeom prst="rect">
+              <a:avLst/>
+            </a:prstGeom>
+            <a:noFill/>
+          </p:spPr>
+          <p:txBody>
+            <a:bodyPr lIns="0" rIns="0" tIns="0" bIns="0" anchorCtr="1" anchor="ctr" wrap="none"/>
+            <a:lstStyle/>
+            <a:p>
+              <a:pPr algn="l" marL="0" marR="0" indent="0">
+                <a:lnSpc>
+                  <a:spcPts val="880"/>
+                </a:lnSpc>
+                <a:spcBef>
+                  <a:spcPts val="0"/>
+                </a:spcBef>
+                <a:spcAft>
+                  <a:spcPts val="0"/>
+                </a:spcAft>
+              </a:pPr>
+              <a:r>
+                <a:rPr sz="880">
+                  <a:solidFill>
+                    <a:srgbClr val="4D4D4D">
+                      <a:alpha val="100000"/>
+                    </a:srgbClr>
+                  </a:solidFill>
+                  <a:latin typeface="Arial"/>
+                  <a:cs typeface="Arial"/>
+                </a:rPr>
+                <a:t>56</a:t>
+              </a:r>
+            </a:p>
+          </p:txBody>
+        </p:sp>
+        <p:sp>
+          <p:nvSpPr>
+            <p:cNvPr id="204" name="tx203"/>
             <p:cNvSpPr/>
             <p:nvPr/>
           </p:nvSpPr>
@@ -9793,7 +10309,7 @@
         </p:sp>
         <p:sp>
           <p:nvSpPr>
-            <p:cNvPr id="193" name="tx192"/>
+            <p:cNvPr id="205" name="tx204"/>
             <p:cNvSpPr/>
             <p:nvPr/>
           </p:nvSpPr>
@@ -9839,7 +10355,7 @@
         </p:sp>
         <p:sp>
           <p:nvSpPr>
-            <p:cNvPr id="194" name="rc193"/>
+            <p:cNvPr id="206" name="rc205"/>
             <p:cNvSpPr/>
             <p:nvPr/>
           </p:nvSpPr>
@@ -9865,7 +10381,7 @@
         </p:sp>
         <p:sp>
           <p:nvSpPr>
-            <p:cNvPr id="195" name="tx194"/>
+            <p:cNvPr id="207" name="tx206"/>
             <p:cNvSpPr/>
             <p:nvPr/>
           </p:nvSpPr>
@@ -9911,7 +10427,7 @@
         </p:sp>
         <p:sp>
           <p:nvSpPr>
-            <p:cNvPr id="196" name="rc195"/>
+            <p:cNvPr id="208" name="rc207"/>
             <p:cNvSpPr/>
             <p:nvPr/>
           </p:nvSpPr>
@@ -9937,7 +10453,7 @@
         </p:sp>
         <p:sp>
           <p:nvSpPr>
-            <p:cNvPr id="197" name="pl196"/>
+            <p:cNvPr id="209" name="pl208"/>
             <p:cNvSpPr/>
             <p:nvPr/>
           </p:nvSpPr>
@@ -9977,7 +10493,7 @@
         </p:sp>
         <p:sp>
           <p:nvSpPr>
-            <p:cNvPr id="198" name="pt197"/>
+            <p:cNvPr id="210" name="pt209"/>
             <p:cNvSpPr/>
             <p:nvPr/>
           </p:nvSpPr>
@@ -10012,7 +10528,7 @@
         </p:sp>
         <p:sp>
           <p:nvSpPr>
-            <p:cNvPr id="199" name="rc198"/>
+            <p:cNvPr id="211" name="rc210"/>
             <p:cNvSpPr/>
             <p:nvPr/>
           </p:nvSpPr>
@@ -10038,7 +10554,7 @@
         </p:sp>
         <p:sp>
           <p:nvSpPr>
-            <p:cNvPr id="200" name="pl199"/>
+            <p:cNvPr id="212" name="pl211"/>
             <p:cNvSpPr/>
             <p:nvPr/>
           </p:nvSpPr>
@@ -10078,7 +10594,7 @@
         </p:sp>
         <p:sp>
           <p:nvSpPr>
-            <p:cNvPr id="201" name="pt200"/>
+            <p:cNvPr id="213" name="pt212"/>
             <p:cNvSpPr/>
             <p:nvPr/>
           </p:nvSpPr>
@@ -10113,7 +10629,7 @@
         </p:sp>
         <p:sp>
           <p:nvSpPr>
-            <p:cNvPr id="202" name="rc201"/>
+            <p:cNvPr id="214" name="rc213"/>
             <p:cNvSpPr/>
             <p:nvPr/>
           </p:nvSpPr>
@@ -10139,7 +10655,7 @@
         </p:sp>
         <p:sp>
           <p:nvSpPr>
-            <p:cNvPr id="203" name="pl202"/>
+            <p:cNvPr id="215" name="pl214"/>
             <p:cNvSpPr/>
             <p:nvPr/>
           </p:nvSpPr>
@@ -10179,7 +10695,7 @@
         </p:sp>
         <p:sp>
           <p:nvSpPr>
-            <p:cNvPr id="204" name="pt203"/>
+            <p:cNvPr id="216" name="pt215"/>
             <p:cNvSpPr/>
             <p:nvPr/>
           </p:nvSpPr>
@@ -10214,7 +10730,7 @@
         </p:sp>
         <p:sp>
           <p:nvSpPr>
-            <p:cNvPr id="205" name="rc204"/>
+            <p:cNvPr id="217" name="rc216"/>
             <p:cNvSpPr/>
             <p:nvPr/>
           </p:nvSpPr>
@@ -10240,7 +10756,7 @@
         </p:sp>
         <p:sp>
           <p:nvSpPr>
-            <p:cNvPr id="206" name="pl205"/>
+            <p:cNvPr id="218" name="pl217"/>
             <p:cNvSpPr/>
             <p:nvPr/>
           </p:nvSpPr>
@@ -10280,7 +10796,7 @@
         </p:sp>
         <p:sp>
           <p:nvSpPr>
-            <p:cNvPr id="207" name="pt206"/>
+            <p:cNvPr id="219" name="pt218"/>
             <p:cNvSpPr/>
             <p:nvPr/>
           </p:nvSpPr>
@@ -10315,7 +10831,7 @@
         </p:sp>
         <p:sp>
           <p:nvSpPr>
-            <p:cNvPr id="208" name="tx207"/>
+            <p:cNvPr id="220" name="tx219"/>
             <p:cNvSpPr/>
             <p:nvPr/>
           </p:nvSpPr>
@@ -10361,7 +10877,7 @@
         </p:sp>
         <p:sp>
           <p:nvSpPr>
-            <p:cNvPr id="209" name="tx208"/>
+            <p:cNvPr id="221" name="tx220"/>
             <p:cNvSpPr/>
             <p:nvPr/>
           </p:nvSpPr>
@@ -10407,7 +10923,7 @@
         </p:sp>
         <p:sp>
           <p:nvSpPr>
-            <p:cNvPr id="210" name="tx209"/>
+            <p:cNvPr id="222" name="tx221"/>
             <p:cNvSpPr/>
             <p:nvPr/>
           </p:nvSpPr>
@@ -10453,7 +10969,7 @@
         </p:sp>
         <p:sp>
           <p:nvSpPr>
-            <p:cNvPr id="211" name="tx210"/>
+            <p:cNvPr id="223" name="tx222"/>
             <p:cNvSpPr/>
             <p:nvPr/>
           </p:nvSpPr>

</xml_diff>

<commit_message>
Added convenience functions for data transformations. xlsx_row2coln, xlsx_trimrow
</commit_message>
<xml_diff>
--- a/vignettes/ONDA_XX-Hazard-Curve.pptx
+++ b/vignettes/ONDA_XX-Hazard-Curve.pptx
@@ -2660,7 +2660,7 @@
           </p:nvSpPr>
           <p:spPr>
             <a:xfrm>
-              <a:off x="1963390" y="983989"/>
+              <a:off x="1539894" y="983989"/>
               <a:ext cx="0" cy="3188077"/>
             </a:xfrm>
             <a:custGeom>
@@ -2703,7 +2703,7 @@
           </p:nvSpPr>
           <p:spPr>
             <a:xfrm>
-              <a:off x="2528052" y="983989"/>
+              <a:off x="1822225" y="983989"/>
               <a:ext cx="0" cy="3188077"/>
             </a:xfrm>
             <a:custGeom>
@@ -2746,7 +2746,7 @@
           </p:nvSpPr>
           <p:spPr>
             <a:xfrm>
-              <a:off x="3092714" y="983989"/>
+              <a:off x="2104556" y="983989"/>
               <a:ext cx="0" cy="3188077"/>
             </a:xfrm>
             <a:custGeom>
@@ -2789,7 +2789,7 @@
           </p:nvSpPr>
           <p:spPr>
             <a:xfrm>
-              <a:off x="3657376" y="983989"/>
+              <a:off x="2386887" y="983989"/>
               <a:ext cx="0" cy="3188077"/>
             </a:xfrm>
             <a:custGeom>
@@ -2832,7 +2832,7 @@
           </p:nvSpPr>
           <p:spPr>
             <a:xfrm>
-              <a:off x="4222037" y="983989"/>
+              <a:off x="2669217" y="983989"/>
               <a:ext cx="0" cy="3188077"/>
             </a:xfrm>
             <a:custGeom>
@@ -2875,7 +2875,7 @@
           </p:nvSpPr>
           <p:spPr>
             <a:xfrm>
-              <a:off x="4786699" y="983989"/>
+              <a:off x="2951548" y="983989"/>
               <a:ext cx="0" cy="3188077"/>
             </a:xfrm>
             <a:custGeom>
@@ -2918,7 +2918,7 @@
           </p:nvSpPr>
           <p:spPr>
             <a:xfrm>
-              <a:off x="5351361" y="983989"/>
+              <a:off x="3233879" y="983989"/>
               <a:ext cx="0" cy="3188077"/>
             </a:xfrm>
             <a:custGeom>
@@ -2961,6 +2961,350 @@
           </p:nvSpPr>
           <p:spPr>
             <a:xfrm>
+              <a:off x="3516210" y="983989"/>
+              <a:ext cx="0" cy="3188077"/>
+            </a:xfrm>
+            <a:custGeom>
+              <a:avLst/>
+              <a:pathLst>
+                <a:path w="0" h="3188077">
+                  <a:moveTo>
+                    <a:pt x="0" y="3188077"/>
+                  </a:moveTo>
+                  <a:lnTo>
+                    <a:pt x="0" y="0"/>
+                  </a:lnTo>
+                  <a:lnTo>
+                    <a:pt x="0" y="0"/>
+                  </a:lnTo>
+                </a:path>
+              </a:pathLst>
+            </a:custGeom>
+            <a:ln w="6775" cap="flat">
+              <a:solidFill>
+                <a:srgbClr val="FFFFFF">
+                  <a:alpha val="100000"/>
+                </a:srgbClr>
+              </a:solidFill>
+              <a:prstDash val="solid"/>
+              <a:round/>
+            </a:ln>
+          </p:spPr>
+          <p:txBody>
+            <a:bodyPr/>
+            <a:lstStyle/>
+            <a:p/>
+          </p:txBody>
+        </p:sp>
+        <p:sp>
+          <p:nvSpPr>
+            <p:cNvPr id="22" name="pl21"/>
+            <p:cNvSpPr/>
+            <p:nvPr/>
+          </p:nvSpPr>
+          <p:spPr>
+            <a:xfrm>
+              <a:off x="3798541" y="983989"/>
+              <a:ext cx="0" cy="3188077"/>
+            </a:xfrm>
+            <a:custGeom>
+              <a:avLst/>
+              <a:pathLst>
+                <a:path w="0" h="3188077">
+                  <a:moveTo>
+                    <a:pt x="0" y="3188077"/>
+                  </a:moveTo>
+                  <a:lnTo>
+                    <a:pt x="0" y="0"/>
+                  </a:lnTo>
+                  <a:lnTo>
+                    <a:pt x="0" y="0"/>
+                  </a:lnTo>
+                </a:path>
+              </a:pathLst>
+            </a:custGeom>
+            <a:ln w="6775" cap="flat">
+              <a:solidFill>
+                <a:srgbClr val="FFFFFF">
+                  <a:alpha val="100000"/>
+                </a:srgbClr>
+              </a:solidFill>
+              <a:prstDash val="solid"/>
+              <a:round/>
+            </a:ln>
+          </p:spPr>
+          <p:txBody>
+            <a:bodyPr/>
+            <a:lstStyle/>
+            <a:p/>
+          </p:txBody>
+        </p:sp>
+        <p:sp>
+          <p:nvSpPr>
+            <p:cNvPr id="23" name="pl22"/>
+            <p:cNvSpPr/>
+            <p:nvPr/>
+          </p:nvSpPr>
+          <p:spPr>
+            <a:xfrm>
+              <a:off x="4080872" y="983989"/>
+              <a:ext cx="0" cy="3188077"/>
+            </a:xfrm>
+            <a:custGeom>
+              <a:avLst/>
+              <a:pathLst>
+                <a:path w="0" h="3188077">
+                  <a:moveTo>
+                    <a:pt x="0" y="3188077"/>
+                  </a:moveTo>
+                  <a:lnTo>
+                    <a:pt x="0" y="0"/>
+                  </a:lnTo>
+                  <a:lnTo>
+                    <a:pt x="0" y="0"/>
+                  </a:lnTo>
+                </a:path>
+              </a:pathLst>
+            </a:custGeom>
+            <a:ln w="6775" cap="flat">
+              <a:solidFill>
+                <a:srgbClr val="FFFFFF">
+                  <a:alpha val="100000"/>
+                </a:srgbClr>
+              </a:solidFill>
+              <a:prstDash val="solid"/>
+              <a:round/>
+            </a:ln>
+          </p:spPr>
+          <p:txBody>
+            <a:bodyPr/>
+            <a:lstStyle/>
+            <a:p/>
+          </p:txBody>
+        </p:sp>
+        <p:sp>
+          <p:nvSpPr>
+            <p:cNvPr id="24" name="pl23"/>
+            <p:cNvSpPr/>
+            <p:nvPr/>
+          </p:nvSpPr>
+          <p:spPr>
+            <a:xfrm>
+              <a:off x="4363203" y="983989"/>
+              <a:ext cx="0" cy="3188077"/>
+            </a:xfrm>
+            <a:custGeom>
+              <a:avLst/>
+              <a:pathLst>
+                <a:path w="0" h="3188077">
+                  <a:moveTo>
+                    <a:pt x="0" y="3188077"/>
+                  </a:moveTo>
+                  <a:lnTo>
+                    <a:pt x="0" y="0"/>
+                  </a:lnTo>
+                  <a:lnTo>
+                    <a:pt x="0" y="0"/>
+                  </a:lnTo>
+                </a:path>
+              </a:pathLst>
+            </a:custGeom>
+            <a:ln w="6775" cap="flat">
+              <a:solidFill>
+                <a:srgbClr val="FFFFFF">
+                  <a:alpha val="100000"/>
+                </a:srgbClr>
+              </a:solidFill>
+              <a:prstDash val="solid"/>
+              <a:round/>
+            </a:ln>
+          </p:spPr>
+          <p:txBody>
+            <a:bodyPr/>
+            <a:lstStyle/>
+            <a:p/>
+          </p:txBody>
+        </p:sp>
+        <p:sp>
+          <p:nvSpPr>
+            <p:cNvPr id="25" name="pl24"/>
+            <p:cNvSpPr/>
+            <p:nvPr/>
+          </p:nvSpPr>
+          <p:spPr>
+            <a:xfrm>
+              <a:off x="4645534" y="983989"/>
+              <a:ext cx="0" cy="3188077"/>
+            </a:xfrm>
+            <a:custGeom>
+              <a:avLst/>
+              <a:pathLst>
+                <a:path w="0" h="3188077">
+                  <a:moveTo>
+                    <a:pt x="0" y="3188077"/>
+                  </a:moveTo>
+                  <a:lnTo>
+                    <a:pt x="0" y="0"/>
+                  </a:lnTo>
+                  <a:lnTo>
+                    <a:pt x="0" y="0"/>
+                  </a:lnTo>
+                </a:path>
+              </a:pathLst>
+            </a:custGeom>
+            <a:ln w="6775" cap="flat">
+              <a:solidFill>
+                <a:srgbClr val="FFFFFF">
+                  <a:alpha val="100000"/>
+                </a:srgbClr>
+              </a:solidFill>
+              <a:prstDash val="solid"/>
+              <a:round/>
+            </a:ln>
+          </p:spPr>
+          <p:txBody>
+            <a:bodyPr/>
+            <a:lstStyle/>
+            <a:p/>
+          </p:txBody>
+        </p:sp>
+        <p:sp>
+          <p:nvSpPr>
+            <p:cNvPr id="26" name="pl25"/>
+            <p:cNvSpPr/>
+            <p:nvPr/>
+          </p:nvSpPr>
+          <p:spPr>
+            <a:xfrm>
+              <a:off x="4927865" y="983989"/>
+              <a:ext cx="0" cy="3188077"/>
+            </a:xfrm>
+            <a:custGeom>
+              <a:avLst/>
+              <a:pathLst>
+                <a:path w="0" h="3188077">
+                  <a:moveTo>
+                    <a:pt x="0" y="3188077"/>
+                  </a:moveTo>
+                  <a:lnTo>
+                    <a:pt x="0" y="0"/>
+                  </a:lnTo>
+                  <a:lnTo>
+                    <a:pt x="0" y="0"/>
+                  </a:lnTo>
+                </a:path>
+              </a:pathLst>
+            </a:custGeom>
+            <a:ln w="6775" cap="flat">
+              <a:solidFill>
+                <a:srgbClr val="FFFFFF">
+                  <a:alpha val="100000"/>
+                </a:srgbClr>
+              </a:solidFill>
+              <a:prstDash val="solid"/>
+              <a:round/>
+            </a:ln>
+          </p:spPr>
+          <p:txBody>
+            <a:bodyPr/>
+            <a:lstStyle/>
+            <a:p/>
+          </p:txBody>
+        </p:sp>
+        <p:sp>
+          <p:nvSpPr>
+            <p:cNvPr id="27" name="pl26"/>
+            <p:cNvSpPr/>
+            <p:nvPr/>
+          </p:nvSpPr>
+          <p:spPr>
+            <a:xfrm>
+              <a:off x="5210196" y="983989"/>
+              <a:ext cx="0" cy="3188077"/>
+            </a:xfrm>
+            <a:custGeom>
+              <a:avLst/>
+              <a:pathLst>
+                <a:path w="0" h="3188077">
+                  <a:moveTo>
+                    <a:pt x="0" y="3188077"/>
+                  </a:moveTo>
+                  <a:lnTo>
+                    <a:pt x="0" y="0"/>
+                  </a:lnTo>
+                  <a:lnTo>
+                    <a:pt x="0" y="0"/>
+                  </a:lnTo>
+                </a:path>
+              </a:pathLst>
+            </a:custGeom>
+            <a:ln w="6775" cap="flat">
+              <a:solidFill>
+                <a:srgbClr val="FFFFFF">
+                  <a:alpha val="100000"/>
+                </a:srgbClr>
+              </a:solidFill>
+              <a:prstDash val="solid"/>
+              <a:round/>
+            </a:ln>
+          </p:spPr>
+          <p:txBody>
+            <a:bodyPr/>
+            <a:lstStyle/>
+            <a:p/>
+          </p:txBody>
+        </p:sp>
+        <p:sp>
+          <p:nvSpPr>
+            <p:cNvPr id="28" name="pl27"/>
+            <p:cNvSpPr/>
+            <p:nvPr/>
+          </p:nvSpPr>
+          <p:spPr>
+            <a:xfrm>
+              <a:off x="5492526" y="983989"/>
+              <a:ext cx="0" cy="3188077"/>
+            </a:xfrm>
+            <a:custGeom>
+              <a:avLst/>
+              <a:pathLst>
+                <a:path w="0" h="3188077">
+                  <a:moveTo>
+                    <a:pt x="0" y="3188077"/>
+                  </a:moveTo>
+                  <a:lnTo>
+                    <a:pt x="0" y="0"/>
+                  </a:lnTo>
+                  <a:lnTo>
+                    <a:pt x="0" y="0"/>
+                  </a:lnTo>
+                </a:path>
+              </a:pathLst>
+            </a:custGeom>
+            <a:ln w="6775" cap="flat">
+              <a:solidFill>
+                <a:srgbClr val="FFFFFF">
+                  <a:alpha val="100000"/>
+                </a:srgbClr>
+              </a:solidFill>
+              <a:prstDash val="solid"/>
+              <a:round/>
+            </a:ln>
+          </p:spPr>
+          <p:txBody>
+            <a:bodyPr/>
+            <a:lstStyle/>
+            <a:p/>
+          </p:txBody>
+        </p:sp>
+        <p:sp>
+          <p:nvSpPr>
+            <p:cNvPr id="29" name="pl28"/>
+            <p:cNvSpPr/>
+            <p:nvPr/>
+          </p:nvSpPr>
+          <p:spPr>
+            <a:xfrm>
               <a:off x="1490486" y="4040699"/>
               <a:ext cx="4192613" cy="0"/>
             </a:xfrm>
@@ -2998,7 +3342,7 @@
         </p:sp>
         <p:sp>
           <p:nvSpPr>
-            <p:cNvPr id="22" name="pl21"/>
+            <p:cNvPr id="30" name="pl29"/>
             <p:cNvSpPr/>
             <p:nvPr/>
           </p:nvSpPr>
@@ -3041,7 +3385,7 @@
         </p:sp>
         <p:sp>
           <p:nvSpPr>
-            <p:cNvPr id="23" name="pl22"/>
+            <p:cNvPr id="31" name="pl30"/>
             <p:cNvSpPr/>
             <p:nvPr/>
           </p:nvSpPr>
@@ -3084,7 +3428,7 @@
         </p:sp>
         <p:sp>
           <p:nvSpPr>
-            <p:cNvPr id="24" name="pl23"/>
+            <p:cNvPr id="32" name="pl31"/>
             <p:cNvSpPr/>
             <p:nvPr/>
           </p:nvSpPr>
@@ -3127,7 +3471,7 @@
         </p:sp>
         <p:sp>
           <p:nvSpPr>
-            <p:cNvPr id="25" name="pl24"/>
+            <p:cNvPr id="33" name="pl32"/>
             <p:cNvSpPr/>
             <p:nvPr/>
           </p:nvSpPr>
@@ -3170,7 +3514,7 @@
         </p:sp>
         <p:sp>
           <p:nvSpPr>
-            <p:cNvPr id="26" name="pl25"/>
+            <p:cNvPr id="34" name="pl33"/>
             <p:cNvSpPr/>
             <p:nvPr/>
           </p:nvSpPr>
@@ -3213,7 +3557,7 @@
         </p:sp>
         <p:sp>
           <p:nvSpPr>
-            <p:cNvPr id="27" name="pl26"/>
+            <p:cNvPr id="35" name="pl34"/>
             <p:cNvSpPr/>
             <p:nvPr/>
           </p:nvSpPr>
@@ -3256,7 +3600,7 @@
         </p:sp>
         <p:sp>
           <p:nvSpPr>
-            <p:cNvPr id="28" name="pl27"/>
+            <p:cNvPr id="36" name="pl35"/>
             <p:cNvSpPr/>
             <p:nvPr/>
           </p:nvSpPr>
@@ -3299,13 +3643,13 @@
         </p:sp>
         <p:sp>
           <p:nvSpPr>
-            <p:cNvPr id="29" name="pl28"/>
-            <p:cNvSpPr/>
-            <p:nvPr/>
-          </p:nvSpPr>
-          <p:spPr>
-            <a:xfrm>
-              <a:off x="2245721" y="983989"/>
+            <p:cNvPr id="37" name="pl36"/>
+            <p:cNvSpPr/>
+            <p:nvPr/>
+          </p:nvSpPr>
+          <p:spPr>
+            <a:xfrm>
+              <a:off x="1963390" y="983989"/>
               <a:ext cx="0" cy="3188077"/>
             </a:xfrm>
             <a:custGeom>
@@ -3342,13 +3686,13 @@
         </p:sp>
         <p:sp>
           <p:nvSpPr>
-            <p:cNvPr id="30" name="pl29"/>
-            <p:cNvSpPr/>
-            <p:nvPr/>
-          </p:nvSpPr>
-          <p:spPr>
-            <a:xfrm>
-              <a:off x="2810383" y="983989"/>
+            <p:cNvPr id="38" name="pl37"/>
+            <p:cNvSpPr/>
+            <p:nvPr/>
+          </p:nvSpPr>
+          <p:spPr>
+            <a:xfrm>
+              <a:off x="2245721" y="983989"/>
               <a:ext cx="0" cy="3188077"/>
             </a:xfrm>
             <a:custGeom>
@@ -3385,13 +3729,13 @@
         </p:sp>
         <p:sp>
           <p:nvSpPr>
-            <p:cNvPr id="31" name="pl30"/>
-            <p:cNvSpPr/>
-            <p:nvPr/>
-          </p:nvSpPr>
-          <p:spPr>
-            <a:xfrm>
-              <a:off x="3375045" y="983989"/>
+            <p:cNvPr id="39" name="pl38"/>
+            <p:cNvSpPr/>
+            <p:nvPr/>
+          </p:nvSpPr>
+          <p:spPr>
+            <a:xfrm>
+              <a:off x="2528052" y="983989"/>
               <a:ext cx="0" cy="3188077"/>
             </a:xfrm>
             <a:custGeom>
@@ -3428,13 +3772,13 @@
         </p:sp>
         <p:sp>
           <p:nvSpPr>
-            <p:cNvPr id="32" name="pl31"/>
-            <p:cNvSpPr/>
-            <p:nvPr/>
-          </p:nvSpPr>
-          <p:spPr>
-            <a:xfrm>
-              <a:off x="3939706" y="983989"/>
+            <p:cNvPr id="40" name="pl39"/>
+            <p:cNvSpPr/>
+            <p:nvPr/>
+          </p:nvSpPr>
+          <p:spPr>
+            <a:xfrm>
+              <a:off x="2810383" y="983989"/>
               <a:ext cx="0" cy="3188077"/>
             </a:xfrm>
             <a:custGeom>
@@ -3471,13 +3815,13 @@
         </p:sp>
         <p:sp>
           <p:nvSpPr>
-            <p:cNvPr id="33" name="pl32"/>
-            <p:cNvSpPr/>
-            <p:nvPr/>
-          </p:nvSpPr>
-          <p:spPr>
-            <a:xfrm>
-              <a:off x="4504368" y="983989"/>
+            <p:cNvPr id="41" name="pl40"/>
+            <p:cNvSpPr/>
+            <p:nvPr/>
+          </p:nvSpPr>
+          <p:spPr>
+            <a:xfrm>
+              <a:off x="3092714" y="983989"/>
               <a:ext cx="0" cy="3188077"/>
             </a:xfrm>
             <a:custGeom>
@@ -3514,13 +3858,13 @@
         </p:sp>
         <p:sp>
           <p:nvSpPr>
-            <p:cNvPr id="34" name="pl33"/>
-            <p:cNvSpPr/>
-            <p:nvPr/>
-          </p:nvSpPr>
-          <p:spPr>
-            <a:xfrm>
-              <a:off x="5069030" y="983989"/>
+            <p:cNvPr id="42" name="pl41"/>
+            <p:cNvSpPr/>
+            <p:nvPr/>
+          </p:nvSpPr>
+          <p:spPr>
+            <a:xfrm>
+              <a:off x="3375045" y="983989"/>
               <a:ext cx="0" cy="3188077"/>
             </a:xfrm>
             <a:custGeom>
@@ -3557,13 +3901,13 @@
         </p:sp>
         <p:sp>
           <p:nvSpPr>
-            <p:cNvPr id="35" name="pl34"/>
-            <p:cNvSpPr/>
-            <p:nvPr/>
-          </p:nvSpPr>
-          <p:spPr>
-            <a:xfrm>
-              <a:off x="5633692" y="983989"/>
+            <p:cNvPr id="43" name="pl42"/>
+            <p:cNvSpPr/>
+            <p:nvPr/>
+          </p:nvSpPr>
+          <p:spPr>
+            <a:xfrm>
+              <a:off x="3657376" y="983989"/>
               <a:ext cx="0" cy="3188077"/>
             </a:xfrm>
             <a:custGeom>
@@ -3600,7 +3944,308 @@
         </p:sp>
         <p:sp>
           <p:nvSpPr>
-            <p:cNvPr id="36" name="pl35"/>
+            <p:cNvPr id="44" name="pl43"/>
+            <p:cNvSpPr/>
+            <p:nvPr/>
+          </p:nvSpPr>
+          <p:spPr>
+            <a:xfrm>
+              <a:off x="3939706" y="983989"/>
+              <a:ext cx="0" cy="3188077"/>
+            </a:xfrm>
+            <a:custGeom>
+              <a:avLst/>
+              <a:pathLst>
+                <a:path w="0" h="3188077">
+                  <a:moveTo>
+                    <a:pt x="0" y="3188077"/>
+                  </a:moveTo>
+                  <a:lnTo>
+                    <a:pt x="0" y="0"/>
+                  </a:lnTo>
+                  <a:lnTo>
+                    <a:pt x="0" y="0"/>
+                  </a:lnTo>
+                </a:path>
+              </a:pathLst>
+            </a:custGeom>
+            <a:ln w="13550" cap="flat">
+              <a:solidFill>
+                <a:srgbClr val="FFFFFF">
+                  <a:alpha val="100000"/>
+                </a:srgbClr>
+              </a:solidFill>
+              <a:prstDash val="solid"/>
+              <a:round/>
+            </a:ln>
+          </p:spPr>
+          <p:txBody>
+            <a:bodyPr/>
+            <a:lstStyle/>
+            <a:p/>
+          </p:txBody>
+        </p:sp>
+        <p:sp>
+          <p:nvSpPr>
+            <p:cNvPr id="45" name="pl44"/>
+            <p:cNvSpPr/>
+            <p:nvPr/>
+          </p:nvSpPr>
+          <p:spPr>
+            <a:xfrm>
+              <a:off x="4222037" y="983989"/>
+              <a:ext cx="0" cy="3188077"/>
+            </a:xfrm>
+            <a:custGeom>
+              <a:avLst/>
+              <a:pathLst>
+                <a:path w="0" h="3188077">
+                  <a:moveTo>
+                    <a:pt x="0" y="3188077"/>
+                  </a:moveTo>
+                  <a:lnTo>
+                    <a:pt x="0" y="0"/>
+                  </a:lnTo>
+                  <a:lnTo>
+                    <a:pt x="0" y="0"/>
+                  </a:lnTo>
+                </a:path>
+              </a:pathLst>
+            </a:custGeom>
+            <a:ln w="13550" cap="flat">
+              <a:solidFill>
+                <a:srgbClr val="FFFFFF">
+                  <a:alpha val="100000"/>
+                </a:srgbClr>
+              </a:solidFill>
+              <a:prstDash val="solid"/>
+              <a:round/>
+            </a:ln>
+          </p:spPr>
+          <p:txBody>
+            <a:bodyPr/>
+            <a:lstStyle/>
+            <a:p/>
+          </p:txBody>
+        </p:sp>
+        <p:sp>
+          <p:nvSpPr>
+            <p:cNvPr id="46" name="pl45"/>
+            <p:cNvSpPr/>
+            <p:nvPr/>
+          </p:nvSpPr>
+          <p:spPr>
+            <a:xfrm>
+              <a:off x="4504368" y="983989"/>
+              <a:ext cx="0" cy="3188077"/>
+            </a:xfrm>
+            <a:custGeom>
+              <a:avLst/>
+              <a:pathLst>
+                <a:path w="0" h="3188077">
+                  <a:moveTo>
+                    <a:pt x="0" y="3188077"/>
+                  </a:moveTo>
+                  <a:lnTo>
+                    <a:pt x="0" y="0"/>
+                  </a:lnTo>
+                  <a:lnTo>
+                    <a:pt x="0" y="0"/>
+                  </a:lnTo>
+                </a:path>
+              </a:pathLst>
+            </a:custGeom>
+            <a:ln w="13550" cap="flat">
+              <a:solidFill>
+                <a:srgbClr val="FFFFFF">
+                  <a:alpha val="100000"/>
+                </a:srgbClr>
+              </a:solidFill>
+              <a:prstDash val="solid"/>
+              <a:round/>
+            </a:ln>
+          </p:spPr>
+          <p:txBody>
+            <a:bodyPr/>
+            <a:lstStyle/>
+            <a:p/>
+          </p:txBody>
+        </p:sp>
+        <p:sp>
+          <p:nvSpPr>
+            <p:cNvPr id="47" name="pl46"/>
+            <p:cNvSpPr/>
+            <p:nvPr/>
+          </p:nvSpPr>
+          <p:spPr>
+            <a:xfrm>
+              <a:off x="4786699" y="983989"/>
+              <a:ext cx="0" cy="3188077"/>
+            </a:xfrm>
+            <a:custGeom>
+              <a:avLst/>
+              <a:pathLst>
+                <a:path w="0" h="3188077">
+                  <a:moveTo>
+                    <a:pt x="0" y="3188077"/>
+                  </a:moveTo>
+                  <a:lnTo>
+                    <a:pt x="0" y="0"/>
+                  </a:lnTo>
+                  <a:lnTo>
+                    <a:pt x="0" y="0"/>
+                  </a:lnTo>
+                </a:path>
+              </a:pathLst>
+            </a:custGeom>
+            <a:ln w="13550" cap="flat">
+              <a:solidFill>
+                <a:srgbClr val="FFFFFF">
+                  <a:alpha val="100000"/>
+                </a:srgbClr>
+              </a:solidFill>
+              <a:prstDash val="solid"/>
+              <a:round/>
+            </a:ln>
+          </p:spPr>
+          <p:txBody>
+            <a:bodyPr/>
+            <a:lstStyle/>
+            <a:p/>
+          </p:txBody>
+        </p:sp>
+        <p:sp>
+          <p:nvSpPr>
+            <p:cNvPr id="48" name="pl47"/>
+            <p:cNvSpPr/>
+            <p:nvPr/>
+          </p:nvSpPr>
+          <p:spPr>
+            <a:xfrm>
+              <a:off x="5069030" y="983989"/>
+              <a:ext cx="0" cy="3188077"/>
+            </a:xfrm>
+            <a:custGeom>
+              <a:avLst/>
+              <a:pathLst>
+                <a:path w="0" h="3188077">
+                  <a:moveTo>
+                    <a:pt x="0" y="3188077"/>
+                  </a:moveTo>
+                  <a:lnTo>
+                    <a:pt x="0" y="0"/>
+                  </a:lnTo>
+                  <a:lnTo>
+                    <a:pt x="0" y="0"/>
+                  </a:lnTo>
+                </a:path>
+              </a:pathLst>
+            </a:custGeom>
+            <a:ln w="13550" cap="flat">
+              <a:solidFill>
+                <a:srgbClr val="FFFFFF">
+                  <a:alpha val="100000"/>
+                </a:srgbClr>
+              </a:solidFill>
+              <a:prstDash val="solid"/>
+              <a:round/>
+            </a:ln>
+          </p:spPr>
+          <p:txBody>
+            <a:bodyPr/>
+            <a:lstStyle/>
+            <a:p/>
+          </p:txBody>
+        </p:sp>
+        <p:sp>
+          <p:nvSpPr>
+            <p:cNvPr id="49" name="pl48"/>
+            <p:cNvSpPr/>
+            <p:nvPr/>
+          </p:nvSpPr>
+          <p:spPr>
+            <a:xfrm>
+              <a:off x="5351361" y="983989"/>
+              <a:ext cx="0" cy="3188077"/>
+            </a:xfrm>
+            <a:custGeom>
+              <a:avLst/>
+              <a:pathLst>
+                <a:path w="0" h="3188077">
+                  <a:moveTo>
+                    <a:pt x="0" y="3188077"/>
+                  </a:moveTo>
+                  <a:lnTo>
+                    <a:pt x="0" y="0"/>
+                  </a:lnTo>
+                  <a:lnTo>
+                    <a:pt x="0" y="0"/>
+                  </a:lnTo>
+                </a:path>
+              </a:pathLst>
+            </a:custGeom>
+            <a:ln w="13550" cap="flat">
+              <a:solidFill>
+                <a:srgbClr val="FFFFFF">
+                  <a:alpha val="100000"/>
+                </a:srgbClr>
+              </a:solidFill>
+              <a:prstDash val="solid"/>
+              <a:round/>
+            </a:ln>
+          </p:spPr>
+          <p:txBody>
+            <a:bodyPr/>
+            <a:lstStyle/>
+            <a:p/>
+          </p:txBody>
+        </p:sp>
+        <p:sp>
+          <p:nvSpPr>
+            <p:cNvPr id="50" name="pl49"/>
+            <p:cNvSpPr/>
+            <p:nvPr/>
+          </p:nvSpPr>
+          <p:spPr>
+            <a:xfrm>
+              <a:off x="5633692" y="983989"/>
+              <a:ext cx="0" cy="3188077"/>
+            </a:xfrm>
+            <a:custGeom>
+              <a:avLst/>
+              <a:pathLst>
+                <a:path w="0" h="3188077">
+                  <a:moveTo>
+                    <a:pt x="0" y="3188077"/>
+                  </a:moveTo>
+                  <a:lnTo>
+                    <a:pt x="0" y="0"/>
+                  </a:lnTo>
+                  <a:lnTo>
+                    <a:pt x="0" y="0"/>
+                  </a:lnTo>
+                </a:path>
+              </a:pathLst>
+            </a:custGeom>
+            <a:ln w="13550" cap="flat">
+              <a:solidFill>
+                <a:srgbClr val="FFFFFF">
+                  <a:alpha val="100000"/>
+                </a:srgbClr>
+              </a:solidFill>
+              <a:prstDash val="solid"/>
+              <a:round/>
+            </a:ln>
+          </p:spPr>
+          <p:txBody>
+            <a:bodyPr/>
+            <a:lstStyle/>
+            <a:p/>
+          </p:txBody>
+        </p:sp>
+        <p:sp>
+          <p:nvSpPr>
+            <p:cNvPr id="51" name="pl50"/>
             <p:cNvSpPr/>
             <p:nvPr/>
           </p:nvSpPr>
@@ -3709,7 +4354,7 @@
         </p:sp>
         <p:sp>
           <p:nvSpPr>
-            <p:cNvPr id="37" name="pl36"/>
+            <p:cNvPr id="52" name="pl51"/>
             <p:cNvSpPr/>
             <p:nvPr/>
           </p:nvSpPr>
@@ -3827,7 +4472,7 @@
         </p:sp>
         <p:sp>
           <p:nvSpPr>
-            <p:cNvPr id="38" name="pl37"/>
+            <p:cNvPr id="53" name="pl52"/>
             <p:cNvSpPr/>
             <p:nvPr/>
           </p:nvSpPr>
@@ -3939,7 +4584,7 @@
         </p:sp>
         <p:sp>
           <p:nvSpPr>
-            <p:cNvPr id="39" name="pl38"/>
+            <p:cNvPr id="54" name="pl53"/>
             <p:cNvSpPr/>
             <p:nvPr/>
           </p:nvSpPr>
@@ -4051,7 +4696,7 @@
         </p:sp>
         <p:sp>
           <p:nvSpPr>
-            <p:cNvPr id="40" name="pt39"/>
+            <p:cNvPr id="55" name="pt54"/>
             <p:cNvSpPr/>
             <p:nvPr/>
           </p:nvSpPr>
@@ -4086,7 +4731,7 @@
         </p:sp>
         <p:sp>
           <p:nvSpPr>
-            <p:cNvPr id="41" name="pt40"/>
+            <p:cNvPr id="56" name="pt55"/>
             <p:cNvSpPr/>
             <p:nvPr/>
           </p:nvSpPr>
@@ -4121,7 +4766,7 @@
         </p:sp>
         <p:sp>
           <p:nvSpPr>
-            <p:cNvPr id="42" name="pt41"/>
+            <p:cNvPr id="57" name="pt56"/>
             <p:cNvSpPr/>
             <p:nvPr/>
           </p:nvSpPr>
@@ -4156,7 +4801,7 @@
         </p:sp>
         <p:sp>
           <p:nvSpPr>
-            <p:cNvPr id="43" name="pt42"/>
+            <p:cNvPr id="58" name="pt57"/>
             <p:cNvSpPr/>
             <p:nvPr/>
           </p:nvSpPr>
@@ -4191,7 +4836,7 @@
         </p:sp>
         <p:sp>
           <p:nvSpPr>
-            <p:cNvPr id="44" name="pt43"/>
+            <p:cNvPr id="59" name="pt58"/>
             <p:cNvSpPr/>
             <p:nvPr/>
           </p:nvSpPr>
@@ -4226,7 +4871,7 @@
         </p:sp>
         <p:sp>
           <p:nvSpPr>
-            <p:cNvPr id="45" name="pt44"/>
+            <p:cNvPr id="60" name="pt59"/>
             <p:cNvSpPr/>
             <p:nvPr/>
           </p:nvSpPr>
@@ -4261,7 +4906,7 @@
         </p:sp>
         <p:sp>
           <p:nvSpPr>
-            <p:cNvPr id="46" name="pt45"/>
+            <p:cNvPr id="61" name="pt60"/>
             <p:cNvSpPr/>
             <p:nvPr/>
           </p:nvSpPr>
@@ -4296,7 +4941,7 @@
         </p:sp>
         <p:sp>
           <p:nvSpPr>
-            <p:cNvPr id="47" name="pt46"/>
+            <p:cNvPr id="62" name="pt61"/>
             <p:cNvSpPr/>
             <p:nvPr/>
           </p:nvSpPr>
@@ -4331,7 +4976,7 @@
         </p:sp>
         <p:sp>
           <p:nvSpPr>
-            <p:cNvPr id="48" name="pt47"/>
+            <p:cNvPr id="63" name="pt62"/>
             <p:cNvSpPr/>
             <p:nvPr/>
           </p:nvSpPr>
@@ -4366,7 +5011,7 @@
         </p:sp>
         <p:sp>
           <p:nvSpPr>
-            <p:cNvPr id="49" name="pt48"/>
+            <p:cNvPr id="64" name="pt63"/>
             <p:cNvSpPr/>
             <p:nvPr/>
           </p:nvSpPr>
@@ -4401,7 +5046,7 @@
         </p:sp>
         <p:sp>
           <p:nvSpPr>
-            <p:cNvPr id="50" name="pt49"/>
+            <p:cNvPr id="65" name="pt64"/>
             <p:cNvSpPr/>
             <p:nvPr/>
           </p:nvSpPr>
@@ -4436,7 +5081,7 @@
         </p:sp>
         <p:sp>
           <p:nvSpPr>
-            <p:cNvPr id="51" name="pt50"/>
+            <p:cNvPr id="66" name="pt65"/>
             <p:cNvSpPr/>
             <p:nvPr/>
           </p:nvSpPr>
@@ -4471,7 +5116,7 @@
         </p:sp>
         <p:sp>
           <p:nvSpPr>
-            <p:cNvPr id="52" name="pt51"/>
+            <p:cNvPr id="67" name="pt66"/>
             <p:cNvSpPr/>
             <p:nvPr/>
           </p:nvSpPr>
@@ -4506,7 +5151,7 @@
         </p:sp>
         <p:sp>
           <p:nvSpPr>
-            <p:cNvPr id="53" name="pt52"/>
+            <p:cNvPr id="68" name="pt67"/>
             <p:cNvSpPr/>
             <p:nvPr/>
           </p:nvSpPr>
@@ -4541,7 +5186,7 @@
         </p:sp>
         <p:sp>
           <p:nvSpPr>
-            <p:cNvPr id="54" name="pt53"/>
+            <p:cNvPr id="69" name="pt68"/>
             <p:cNvSpPr/>
             <p:nvPr/>
           </p:nvSpPr>
@@ -4576,7 +5221,7 @@
         </p:sp>
         <p:sp>
           <p:nvSpPr>
-            <p:cNvPr id="55" name="pt54"/>
+            <p:cNvPr id="70" name="pt69"/>
             <p:cNvSpPr/>
             <p:nvPr/>
           </p:nvSpPr>
@@ -4611,7 +5256,7 @@
         </p:sp>
         <p:sp>
           <p:nvSpPr>
-            <p:cNvPr id="56" name="pt55"/>
+            <p:cNvPr id="71" name="pt70"/>
             <p:cNvSpPr/>
             <p:nvPr/>
           </p:nvSpPr>
@@ -4646,7 +5291,7 @@
         </p:sp>
         <p:sp>
           <p:nvSpPr>
-            <p:cNvPr id="57" name="pt56"/>
+            <p:cNvPr id="72" name="pt71"/>
             <p:cNvSpPr/>
             <p:nvPr/>
           </p:nvSpPr>
@@ -4681,7 +5326,7 @@
         </p:sp>
         <p:sp>
           <p:nvSpPr>
-            <p:cNvPr id="58" name="pt57"/>
+            <p:cNvPr id="73" name="pt72"/>
             <p:cNvSpPr/>
             <p:nvPr/>
           </p:nvSpPr>
@@ -4716,7 +5361,7 @@
         </p:sp>
         <p:sp>
           <p:nvSpPr>
-            <p:cNvPr id="59" name="pt58"/>
+            <p:cNvPr id="74" name="pt73"/>
             <p:cNvSpPr/>
             <p:nvPr/>
           </p:nvSpPr>
@@ -4751,7 +5396,7 @@
         </p:sp>
         <p:sp>
           <p:nvSpPr>
-            <p:cNvPr id="60" name="pt59"/>
+            <p:cNvPr id="75" name="pt74"/>
             <p:cNvSpPr/>
             <p:nvPr/>
           </p:nvSpPr>
@@ -4786,7 +5431,7 @@
         </p:sp>
         <p:sp>
           <p:nvSpPr>
-            <p:cNvPr id="61" name="pt60"/>
+            <p:cNvPr id="76" name="pt75"/>
             <p:cNvSpPr/>
             <p:nvPr/>
           </p:nvSpPr>
@@ -4821,7 +5466,7 @@
         </p:sp>
         <p:sp>
           <p:nvSpPr>
-            <p:cNvPr id="62" name="pt61"/>
+            <p:cNvPr id="77" name="pt76"/>
             <p:cNvSpPr/>
             <p:nvPr/>
           </p:nvSpPr>
@@ -4856,7 +5501,7 @@
         </p:sp>
         <p:sp>
           <p:nvSpPr>
-            <p:cNvPr id="63" name="pt62"/>
+            <p:cNvPr id="78" name="pt77"/>
             <p:cNvSpPr/>
             <p:nvPr/>
           </p:nvSpPr>
@@ -4891,7 +5536,7 @@
         </p:sp>
         <p:sp>
           <p:nvSpPr>
-            <p:cNvPr id="64" name="pt63"/>
+            <p:cNvPr id="79" name="pt78"/>
             <p:cNvSpPr/>
             <p:nvPr/>
           </p:nvSpPr>
@@ -4926,7 +5571,7 @@
         </p:sp>
         <p:sp>
           <p:nvSpPr>
-            <p:cNvPr id="65" name="pt64"/>
+            <p:cNvPr id="80" name="pt79"/>
             <p:cNvSpPr/>
             <p:nvPr/>
           </p:nvSpPr>
@@ -4961,7 +5606,7 @@
         </p:sp>
         <p:sp>
           <p:nvSpPr>
-            <p:cNvPr id="66" name="pt65"/>
+            <p:cNvPr id="81" name="pt80"/>
             <p:cNvSpPr/>
             <p:nvPr/>
           </p:nvSpPr>
@@ -4996,7 +5641,7 @@
         </p:sp>
         <p:sp>
           <p:nvSpPr>
-            <p:cNvPr id="67" name="pt66"/>
+            <p:cNvPr id="82" name="pt81"/>
             <p:cNvSpPr/>
             <p:nvPr/>
           </p:nvSpPr>
@@ -5031,7 +5676,7 @@
         </p:sp>
         <p:sp>
           <p:nvSpPr>
-            <p:cNvPr id="68" name="pt67"/>
+            <p:cNvPr id="83" name="pt82"/>
             <p:cNvSpPr/>
             <p:nvPr/>
           </p:nvSpPr>
@@ -5066,7 +5711,7 @@
         </p:sp>
         <p:sp>
           <p:nvSpPr>
-            <p:cNvPr id="69" name="pt68"/>
+            <p:cNvPr id="84" name="pt83"/>
             <p:cNvSpPr/>
             <p:nvPr/>
           </p:nvSpPr>
@@ -5101,7 +5746,7 @@
         </p:sp>
         <p:sp>
           <p:nvSpPr>
-            <p:cNvPr id="70" name="pt69"/>
+            <p:cNvPr id="85" name="pt84"/>
             <p:cNvSpPr/>
             <p:nvPr/>
           </p:nvSpPr>
@@ -5136,7 +5781,7 @@
         </p:sp>
         <p:sp>
           <p:nvSpPr>
-            <p:cNvPr id="71" name="pt70"/>
+            <p:cNvPr id="86" name="pt85"/>
             <p:cNvSpPr/>
             <p:nvPr/>
           </p:nvSpPr>
@@ -5171,7 +5816,7 @@
         </p:sp>
         <p:sp>
           <p:nvSpPr>
-            <p:cNvPr id="72" name="pt71"/>
+            <p:cNvPr id="87" name="pt86"/>
             <p:cNvSpPr/>
             <p:nvPr/>
           </p:nvSpPr>
@@ -5206,7 +5851,7 @@
         </p:sp>
         <p:sp>
           <p:nvSpPr>
-            <p:cNvPr id="73" name="pt72"/>
+            <p:cNvPr id="88" name="pt87"/>
             <p:cNvSpPr/>
             <p:nvPr/>
           </p:nvSpPr>
@@ -5241,7 +5886,7 @@
         </p:sp>
         <p:sp>
           <p:nvSpPr>
-            <p:cNvPr id="74" name="pt73"/>
+            <p:cNvPr id="89" name="pt88"/>
             <p:cNvSpPr/>
             <p:nvPr/>
           </p:nvSpPr>
@@ -5276,7 +5921,7 @@
         </p:sp>
         <p:sp>
           <p:nvSpPr>
-            <p:cNvPr id="75" name="pt74"/>
+            <p:cNvPr id="90" name="pt89"/>
             <p:cNvSpPr/>
             <p:nvPr/>
           </p:nvSpPr>
@@ -5311,7 +5956,7 @@
         </p:sp>
         <p:sp>
           <p:nvSpPr>
-            <p:cNvPr id="76" name="pt75"/>
+            <p:cNvPr id="91" name="pt90"/>
             <p:cNvSpPr/>
             <p:nvPr/>
           </p:nvSpPr>
@@ -5346,7 +5991,7 @@
         </p:sp>
         <p:sp>
           <p:nvSpPr>
-            <p:cNvPr id="77" name="pt76"/>
+            <p:cNvPr id="92" name="pt91"/>
             <p:cNvSpPr/>
             <p:nvPr/>
           </p:nvSpPr>
@@ -5381,7 +6026,7 @@
         </p:sp>
         <p:sp>
           <p:nvSpPr>
-            <p:cNvPr id="78" name="pt77"/>
+            <p:cNvPr id="93" name="pt92"/>
             <p:cNvSpPr/>
             <p:nvPr/>
           </p:nvSpPr>
@@ -5416,7 +6061,7 @@
         </p:sp>
         <p:sp>
           <p:nvSpPr>
-            <p:cNvPr id="79" name="pt78"/>
+            <p:cNvPr id="94" name="pt93"/>
             <p:cNvSpPr/>
             <p:nvPr/>
           </p:nvSpPr>
@@ -5451,7 +6096,7 @@
         </p:sp>
         <p:sp>
           <p:nvSpPr>
-            <p:cNvPr id="80" name="pt79"/>
+            <p:cNvPr id="95" name="pt94"/>
             <p:cNvSpPr/>
             <p:nvPr/>
           </p:nvSpPr>
@@ -5486,7 +6131,7 @@
         </p:sp>
         <p:sp>
           <p:nvSpPr>
-            <p:cNvPr id="81" name="pt80"/>
+            <p:cNvPr id="96" name="pt95"/>
             <p:cNvSpPr/>
             <p:nvPr/>
           </p:nvSpPr>
@@ -5521,7 +6166,7 @@
         </p:sp>
         <p:sp>
           <p:nvSpPr>
-            <p:cNvPr id="82" name="pt81"/>
+            <p:cNvPr id="97" name="pt96"/>
             <p:cNvSpPr/>
             <p:nvPr/>
           </p:nvSpPr>
@@ -5556,7 +6201,7 @@
         </p:sp>
         <p:sp>
           <p:nvSpPr>
-            <p:cNvPr id="83" name="pt82"/>
+            <p:cNvPr id="98" name="pt97"/>
             <p:cNvSpPr/>
             <p:nvPr/>
           </p:nvSpPr>
@@ -5591,7 +6236,7 @@
         </p:sp>
         <p:sp>
           <p:nvSpPr>
-            <p:cNvPr id="84" name="pt83"/>
+            <p:cNvPr id="99" name="pt98"/>
             <p:cNvSpPr/>
             <p:nvPr/>
           </p:nvSpPr>
@@ -5626,7 +6271,7 @@
         </p:sp>
         <p:sp>
           <p:nvSpPr>
-            <p:cNvPr id="85" name="pt84"/>
+            <p:cNvPr id="100" name="pt99"/>
             <p:cNvSpPr/>
             <p:nvPr/>
           </p:nvSpPr>
@@ -5661,7 +6306,7 @@
         </p:sp>
         <p:sp>
           <p:nvSpPr>
-            <p:cNvPr id="86" name="pt85"/>
+            <p:cNvPr id="101" name="pt100"/>
             <p:cNvSpPr/>
             <p:nvPr/>
           </p:nvSpPr>
@@ -5696,7 +6341,7 @@
         </p:sp>
         <p:sp>
           <p:nvSpPr>
-            <p:cNvPr id="87" name="pt86"/>
+            <p:cNvPr id="102" name="pt101"/>
             <p:cNvSpPr/>
             <p:nvPr/>
           </p:nvSpPr>
@@ -5731,7 +6376,7 @@
         </p:sp>
         <p:sp>
           <p:nvSpPr>
-            <p:cNvPr id="88" name="pt87"/>
+            <p:cNvPr id="103" name="pt102"/>
             <p:cNvSpPr/>
             <p:nvPr/>
           </p:nvSpPr>
@@ -5766,7 +6411,7 @@
         </p:sp>
         <p:sp>
           <p:nvSpPr>
-            <p:cNvPr id="89" name="pt88"/>
+            <p:cNvPr id="104" name="pt103"/>
             <p:cNvSpPr/>
             <p:nvPr/>
           </p:nvSpPr>
@@ -5801,7 +6446,7 @@
         </p:sp>
         <p:sp>
           <p:nvSpPr>
-            <p:cNvPr id="90" name="pt89"/>
+            <p:cNvPr id="105" name="pt104"/>
             <p:cNvSpPr/>
             <p:nvPr/>
           </p:nvSpPr>
@@ -5836,7 +6481,7 @@
         </p:sp>
         <p:sp>
           <p:nvSpPr>
-            <p:cNvPr id="91" name="pt90"/>
+            <p:cNvPr id="106" name="pt105"/>
             <p:cNvSpPr/>
             <p:nvPr/>
           </p:nvSpPr>
@@ -5871,7 +6516,7 @@
         </p:sp>
         <p:sp>
           <p:nvSpPr>
-            <p:cNvPr id="92" name="pt91"/>
+            <p:cNvPr id="107" name="pt106"/>
             <p:cNvSpPr/>
             <p:nvPr/>
           </p:nvSpPr>
@@ -5906,7 +6551,7 @@
         </p:sp>
         <p:sp>
           <p:nvSpPr>
-            <p:cNvPr id="93" name="pt92"/>
+            <p:cNvPr id="108" name="pt107"/>
             <p:cNvSpPr/>
             <p:nvPr/>
           </p:nvSpPr>
@@ -5941,7 +6586,7 @@
         </p:sp>
         <p:sp>
           <p:nvSpPr>
-            <p:cNvPr id="94" name="pt93"/>
+            <p:cNvPr id="109" name="pt108"/>
             <p:cNvSpPr/>
             <p:nvPr/>
           </p:nvSpPr>
@@ -5976,7 +6621,7 @@
         </p:sp>
         <p:sp>
           <p:nvSpPr>
-            <p:cNvPr id="95" name="pt94"/>
+            <p:cNvPr id="110" name="pt109"/>
             <p:cNvSpPr/>
             <p:nvPr/>
           </p:nvSpPr>
@@ -6011,7 +6656,7 @@
         </p:sp>
         <p:sp>
           <p:nvSpPr>
-            <p:cNvPr id="96" name="pt95"/>
+            <p:cNvPr id="111" name="pt110"/>
             <p:cNvSpPr/>
             <p:nvPr/>
           </p:nvSpPr>
@@ -6046,7 +6691,7 @@
         </p:sp>
         <p:sp>
           <p:nvSpPr>
-            <p:cNvPr id="97" name="pt96"/>
+            <p:cNvPr id="112" name="pt111"/>
             <p:cNvSpPr/>
             <p:nvPr/>
           </p:nvSpPr>
@@ -6081,7 +6726,7 @@
         </p:sp>
         <p:sp>
           <p:nvSpPr>
-            <p:cNvPr id="98" name="pt97"/>
+            <p:cNvPr id="113" name="pt112"/>
             <p:cNvSpPr/>
             <p:nvPr/>
           </p:nvSpPr>
@@ -6116,7 +6761,7 @@
         </p:sp>
         <p:sp>
           <p:nvSpPr>
-            <p:cNvPr id="99" name="pt98"/>
+            <p:cNvPr id="114" name="pt113"/>
             <p:cNvSpPr/>
             <p:nvPr/>
           </p:nvSpPr>
@@ -6151,7 +6796,7 @@
         </p:sp>
         <p:sp>
           <p:nvSpPr>
-            <p:cNvPr id="100" name="pt99"/>
+            <p:cNvPr id="115" name="pt114"/>
             <p:cNvSpPr/>
             <p:nvPr/>
           </p:nvSpPr>
@@ -6186,7 +6831,7 @@
         </p:sp>
         <p:sp>
           <p:nvSpPr>
-            <p:cNvPr id="101" name="pt100"/>
+            <p:cNvPr id="116" name="pt115"/>
             <p:cNvSpPr/>
             <p:nvPr/>
           </p:nvSpPr>
@@ -6221,7 +6866,7 @@
         </p:sp>
         <p:sp>
           <p:nvSpPr>
-            <p:cNvPr id="102" name="pt101"/>
+            <p:cNvPr id="117" name="pt116"/>
             <p:cNvSpPr/>
             <p:nvPr/>
           </p:nvSpPr>
@@ -6256,7 +6901,7 @@
         </p:sp>
         <p:sp>
           <p:nvSpPr>
-            <p:cNvPr id="103" name="pt102"/>
+            <p:cNvPr id="118" name="pt117"/>
             <p:cNvSpPr/>
             <p:nvPr/>
           </p:nvSpPr>
@@ -6291,7 +6936,7 @@
         </p:sp>
         <p:sp>
           <p:nvSpPr>
-            <p:cNvPr id="104" name="pt103"/>
+            <p:cNvPr id="119" name="pt118"/>
             <p:cNvSpPr/>
             <p:nvPr/>
           </p:nvSpPr>
@@ -6326,7 +6971,7 @@
         </p:sp>
         <p:sp>
           <p:nvSpPr>
-            <p:cNvPr id="105" name="pt104"/>
+            <p:cNvPr id="120" name="pt119"/>
             <p:cNvSpPr/>
             <p:nvPr/>
           </p:nvSpPr>
@@ -6361,7 +7006,7 @@
         </p:sp>
         <p:sp>
           <p:nvSpPr>
-            <p:cNvPr id="106" name="pt105"/>
+            <p:cNvPr id="121" name="pt120"/>
             <p:cNvSpPr/>
             <p:nvPr/>
           </p:nvSpPr>
@@ -6396,7 +7041,7 @@
         </p:sp>
         <p:sp>
           <p:nvSpPr>
-            <p:cNvPr id="107" name="pt106"/>
+            <p:cNvPr id="122" name="pt121"/>
             <p:cNvSpPr/>
             <p:nvPr/>
           </p:nvSpPr>
@@ -6431,7 +7076,7 @@
         </p:sp>
         <p:sp>
           <p:nvSpPr>
-            <p:cNvPr id="108" name="pt107"/>
+            <p:cNvPr id="123" name="pt122"/>
             <p:cNvSpPr/>
             <p:nvPr/>
           </p:nvSpPr>
@@ -6466,7 +7111,7 @@
         </p:sp>
         <p:sp>
           <p:nvSpPr>
-            <p:cNvPr id="109" name="pt108"/>
+            <p:cNvPr id="124" name="pt123"/>
             <p:cNvSpPr/>
             <p:nvPr/>
           </p:nvSpPr>
@@ -6501,7 +7146,7 @@
         </p:sp>
         <p:sp>
           <p:nvSpPr>
-            <p:cNvPr id="110" name="pt109"/>
+            <p:cNvPr id="125" name="pt124"/>
             <p:cNvSpPr/>
             <p:nvPr/>
           </p:nvSpPr>
@@ -6536,7 +7181,7 @@
         </p:sp>
         <p:sp>
           <p:nvSpPr>
-            <p:cNvPr id="111" name="pt110"/>
+            <p:cNvPr id="126" name="pt125"/>
             <p:cNvSpPr/>
             <p:nvPr/>
           </p:nvSpPr>
@@ -6571,7 +7216,7 @@
         </p:sp>
         <p:sp>
           <p:nvSpPr>
-            <p:cNvPr id="112" name="pt111"/>
+            <p:cNvPr id="127" name="pt126"/>
             <p:cNvSpPr/>
             <p:nvPr/>
           </p:nvSpPr>
@@ -6606,7 +7251,7 @@
         </p:sp>
         <p:sp>
           <p:nvSpPr>
-            <p:cNvPr id="113" name="pt112"/>
+            <p:cNvPr id="128" name="pt127"/>
             <p:cNvSpPr/>
             <p:nvPr/>
           </p:nvSpPr>
@@ -6641,7 +7286,7 @@
         </p:sp>
         <p:sp>
           <p:nvSpPr>
-            <p:cNvPr id="114" name="pt113"/>
+            <p:cNvPr id="129" name="pt128"/>
             <p:cNvSpPr/>
             <p:nvPr/>
           </p:nvSpPr>
@@ -6676,7 +7321,7 @@
         </p:sp>
         <p:sp>
           <p:nvSpPr>
-            <p:cNvPr id="115" name="pt114"/>
+            <p:cNvPr id="130" name="pt129"/>
             <p:cNvSpPr/>
             <p:nvPr/>
           </p:nvSpPr>
@@ -6711,7 +7356,7 @@
         </p:sp>
         <p:sp>
           <p:nvSpPr>
-            <p:cNvPr id="116" name="pt115"/>
+            <p:cNvPr id="131" name="pt130"/>
             <p:cNvSpPr/>
             <p:nvPr/>
           </p:nvSpPr>
@@ -6746,7 +7391,7 @@
         </p:sp>
         <p:sp>
           <p:nvSpPr>
-            <p:cNvPr id="117" name="pt116"/>
+            <p:cNvPr id="132" name="pt131"/>
             <p:cNvSpPr/>
             <p:nvPr/>
           </p:nvSpPr>
@@ -6781,7 +7426,7 @@
         </p:sp>
         <p:sp>
           <p:nvSpPr>
-            <p:cNvPr id="118" name="pt117"/>
+            <p:cNvPr id="133" name="pt132"/>
             <p:cNvSpPr/>
             <p:nvPr/>
           </p:nvSpPr>
@@ -6816,7 +7461,7 @@
         </p:sp>
         <p:sp>
           <p:nvSpPr>
-            <p:cNvPr id="119" name="pt118"/>
+            <p:cNvPr id="134" name="pt133"/>
             <p:cNvSpPr/>
             <p:nvPr/>
           </p:nvSpPr>
@@ -6851,7 +7496,7 @@
         </p:sp>
         <p:sp>
           <p:nvSpPr>
-            <p:cNvPr id="120" name="pt119"/>
+            <p:cNvPr id="135" name="pt134"/>
             <p:cNvSpPr/>
             <p:nvPr/>
           </p:nvSpPr>
@@ -6886,7 +7531,7 @@
         </p:sp>
         <p:sp>
           <p:nvSpPr>
-            <p:cNvPr id="121" name="pt120"/>
+            <p:cNvPr id="136" name="pt135"/>
             <p:cNvSpPr/>
             <p:nvPr/>
           </p:nvSpPr>
@@ -6921,7 +7566,7 @@
         </p:sp>
         <p:sp>
           <p:nvSpPr>
-            <p:cNvPr id="122" name="pt121"/>
+            <p:cNvPr id="137" name="pt136"/>
             <p:cNvSpPr/>
             <p:nvPr/>
           </p:nvSpPr>
@@ -6956,7 +7601,7 @@
         </p:sp>
         <p:sp>
           <p:nvSpPr>
-            <p:cNvPr id="123" name="pt122"/>
+            <p:cNvPr id="138" name="pt137"/>
             <p:cNvSpPr/>
             <p:nvPr/>
           </p:nvSpPr>
@@ -6991,7 +7636,7 @@
         </p:sp>
         <p:sp>
           <p:nvSpPr>
-            <p:cNvPr id="124" name="pt123"/>
+            <p:cNvPr id="139" name="pt138"/>
             <p:cNvSpPr/>
             <p:nvPr/>
           </p:nvSpPr>
@@ -7026,7 +7671,7 @@
         </p:sp>
         <p:sp>
           <p:nvSpPr>
-            <p:cNvPr id="125" name="pt124"/>
+            <p:cNvPr id="140" name="pt139"/>
             <p:cNvSpPr/>
             <p:nvPr/>
           </p:nvSpPr>
@@ -7061,7 +7706,7 @@
         </p:sp>
         <p:sp>
           <p:nvSpPr>
-            <p:cNvPr id="126" name="pt125"/>
+            <p:cNvPr id="141" name="pt140"/>
             <p:cNvSpPr/>
             <p:nvPr/>
           </p:nvSpPr>
@@ -7096,7 +7741,7 @@
         </p:sp>
         <p:sp>
           <p:nvSpPr>
-            <p:cNvPr id="127" name="pt126"/>
+            <p:cNvPr id="142" name="pt141"/>
             <p:cNvSpPr/>
             <p:nvPr/>
           </p:nvSpPr>
@@ -7131,7 +7776,7 @@
         </p:sp>
         <p:sp>
           <p:nvSpPr>
-            <p:cNvPr id="128" name="pt127"/>
+            <p:cNvPr id="143" name="pt142"/>
             <p:cNvSpPr/>
             <p:nvPr/>
           </p:nvSpPr>
@@ -7166,7 +7811,7 @@
         </p:sp>
         <p:sp>
           <p:nvSpPr>
-            <p:cNvPr id="129" name="pt128"/>
+            <p:cNvPr id="144" name="pt143"/>
             <p:cNvSpPr/>
             <p:nvPr/>
           </p:nvSpPr>
@@ -7201,7 +7846,7 @@
         </p:sp>
         <p:sp>
           <p:nvSpPr>
-            <p:cNvPr id="130" name="pt129"/>
+            <p:cNvPr id="145" name="pt144"/>
             <p:cNvSpPr/>
             <p:nvPr/>
           </p:nvSpPr>
@@ -7236,7 +7881,7 @@
         </p:sp>
         <p:sp>
           <p:nvSpPr>
-            <p:cNvPr id="131" name="pt130"/>
+            <p:cNvPr id="146" name="pt145"/>
             <p:cNvSpPr/>
             <p:nvPr/>
           </p:nvSpPr>
@@ -7271,7 +7916,7 @@
         </p:sp>
         <p:sp>
           <p:nvSpPr>
-            <p:cNvPr id="132" name="pt131"/>
+            <p:cNvPr id="147" name="pt146"/>
             <p:cNvSpPr/>
             <p:nvPr/>
           </p:nvSpPr>
@@ -7306,7 +7951,7 @@
         </p:sp>
         <p:sp>
           <p:nvSpPr>
-            <p:cNvPr id="133" name="pt132"/>
+            <p:cNvPr id="148" name="pt147"/>
             <p:cNvSpPr/>
             <p:nvPr/>
           </p:nvSpPr>
@@ -7341,7 +7986,7 @@
         </p:sp>
         <p:sp>
           <p:nvSpPr>
-            <p:cNvPr id="134" name="pt133"/>
+            <p:cNvPr id="149" name="pt148"/>
             <p:cNvSpPr/>
             <p:nvPr/>
           </p:nvSpPr>
@@ -7376,7 +8021,7 @@
         </p:sp>
         <p:sp>
           <p:nvSpPr>
-            <p:cNvPr id="135" name="pt134"/>
+            <p:cNvPr id="150" name="pt149"/>
             <p:cNvSpPr/>
             <p:nvPr/>
           </p:nvSpPr>
@@ -7411,7 +8056,7 @@
         </p:sp>
         <p:sp>
           <p:nvSpPr>
-            <p:cNvPr id="136" name="pt135"/>
+            <p:cNvPr id="151" name="pt150"/>
             <p:cNvSpPr/>
             <p:nvPr/>
           </p:nvSpPr>
@@ -7446,7 +8091,7 @@
         </p:sp>
         <p:sp>
           <p:nvSpPr>
-            <p:cNvPr id="137" name="pt136"/>
+            <p:cNvPr id="152" name="pt151"/>
             <p:cNvSpPr/>
             <p:nvPr/>
           </p:nvSpPr>
@@ -7481,7 +8126,7 @@
         </p:sp>
         <p:sp>
           <p:nvSpPr>
-            <p:cNvPr id="138" name="pt137"/>
+            <p:cNvPr id="153" name="pt152"/>
             <p:cNvSpPr/>
             <p:nvPr/>
           </p:nvSpPr>
@@ -7516,7 +8161,7 @@
         </p:sp>
         <p:sp>
           <p:nvSpPr>
-            <p:cNvPr id="139" name="pt138"/>
+            <p:cNvPr id="154" name="pt153"/>
             <p:cNvSpPr/>
             <p:nvPr/>
           </p:nvSpPr>
@@ -7551,7 +8196,7 @@
         </p:sp>
         <p:sp>
           <p:nvSpPr>
-            <p:cNvPr id="140" name="pt139"/>
+            <p:cNvPr id="155" name="pt154"/>
             <p:cNvSpPr/>
             <p:nvPr/>
           </p:nvSpPr>
@@ -7586,7 +8231,7 @@
         </p:sp>
         <p:sp>
           <p:nvSpPr>
-            <p:cNvPr id="141" name="pt140"/>
+            <p:cNvPr id="156" name="pt155"/>
             <p:cNvSpPr/>
             <p:nvPr/>
           </p:nvSpPr>
@@ -7621,7 +8266,7 @@
         </p:sp>
         <p:sp>
           <p:nvSpPr>
-            <p:cNvPr id="142" name="pt141"/>
+            <p:cNvPr id="157" name="pt156"/>
             <p:cNvSpPr/>
             <p:nvPr/>
           </p:nvSpPr>
@@ -7656,7 +8301,7 @@
         </p:sp>
         <p:sp>
           <p:nvSpPr>
-            <p:cNvPr id="143" name="pt142"/>
+            <p:cNvPr id="158" name="pt157"/>
             <p:cNvSpPr/>
             <p:nvPr/>
           </p:nvSpPr>
@@ -7691,7 +8336,7 @@
         </p:sp>
         <p:sp>
           <p:nvSpPr>
-            <p:cNvPr id="144" name="pt143"/>
+            <p:cNvPr id="159" name="pt158"/>
             <p:cNvSpPr/>
             <p:nvPr/>
           </p:nvSpPr>
@@ -7726,7 +8371,7 @@
         </p:sp>
         <p:sp>
           <p:nvSpPr>
-            <p:cNvPr id="145" name="tx144"/>
+            <p:cNvPr id="160" name="tx159"/>
             <p:cNvSpPr/>
             <p:nvPr/>
           </p:nvSpPr>
@@ -7772,7 +8417,7 @@
         </p:sp>
         <p:sp>
           <p:nvSpPr>
-            <p:cNvPr id="146" name="tx145"/>
+            <p:cNvPr id="161" name="tx160"/>
             <p:cNvSpPr/>
             <p:nvPr/>
           </p:nvSpPr>
@@ -7818,7 +8463,7 @@
         </p:sp>
         <p:sp>
           <p:nvSpPr>
-            <p:cNvPr id="147" name="tx146"/>
+            <p:cNvPr id="162" name="tx161"/>
             <p:cNvSpPr/>
             <p:nvPr/>
           </p:nvSpPr>
@@ -7864,7 +8509,7 @@
         </p:sp>
         <p:sp>
           <p:nvSpPr>
-            <p:cNvPr id="148" name="tx147"/>
+            <p:cNvPr id="163" name="tx162"/>
             <p:cNvSpPr/>
             <p:nvPr/>
           </p:nvSpPr>
@@ -7910,7 +8555,7 @@
         </p:sp>
         <p:sp>
           <p:nvSpPr>
-            <p:cNvPr id="149" name="tx148"/>
+            <p:cNvPr id="164" name="tx163"/>
             <p:cNvSpPr/>
             <p:nvPr/>
           </p:nvSpPr>
@@ -7956,7 +8601,7 @@
         </p:sp>
         <p:sp>
           <p:nvSpPr>
-            <p:cNvPr id="150" name="tx149"/>
+            <p:cNvPr id="165" name="tx164"/>
             <p:cNvSpPr/>
             <p:nvPr/>
           </p:nvSpPr>
@@ -8002,7 +8647,7 @@
         </p:sp>
         <p:sp>
           <p:nvSpPr>
-            <p:cNvPr id="151" name="tx150"/>
+            <p:cNvPr id="166" name="tx165"/>
             <p:cNvSpPr/>
             <p:nvPr/>
           </p:nvSpPr>
@@ -8048,7 +8693,7 @@
         </p:sp>
         <p:sp>
           <p:nvSpPr>
-            <p:cNvPr id="152" name="pl151"/>
+            <p:cNvPr id="167" name="pl166"/>
             <p:cNvSpPr/>
             <p:nvPr/>
           </p:nvSpPr>
@@ -8088,7 +8733,7 @@
         </p:sp>
         <p:sp>
           <p:nvSpPr>
-            <p:cNvPr id="153" name="pl152"/>
+            <p:cNvPr id="168" name="pl167"/>
             <p:cNvSpPr/>
             <p:nvPr/>
           </p:nvSpPr>
@@ -8128,7 +8773,7 @@
         </p:sp>
         <p:sp>
           <p:nvSpPr>
-            <p:cNvPr id="154" name="pl153"/>
+            <p:cNvPr id="169" name="pl168"/>
             <p:cNvSpPr/>
             <p:nvPr/>
           </p:nvSpPr>
@@ -8168,7 +8813,7 @@
         </p:sp>
         <p:sp>
           <p:nvSpPr>
-            <p:cNvPr id="155" name="pl154"/>
+            <p:cNvPr id="170" name="pl169"/>
             <p:cNvSpPr/>
             <p:nvPr/>
           </p:nvSpPr>
@@ -8208,7 +8853,7 @@
         </p:sp>
         <p:sp>
           <p:nvSpPr>
-            <p:cNvPr id="156" name="pl155"/>
+            <p:cNvPr id="171" name="pl170"/>
             <p:cNvSpPr/>
             <p:nvPr/>
           </p:nvSpPr>
@@ -8248,7 +8893,7 @@
         </p:sp>
         <p:sp>
           <p:nvSpPr>
-            <p:cNvPr id="157" name="pl156"/>
+            <p:cNvPr id="172" name="pl171"/>
             <p:cNvSpPr/>
             <p:nvPr/>
           </p:nvSpPr>
@@ -8288,7 +8933,7 @@
         </p:sp>
         <p:sp>
           <p:nvSpPr>
-            <p:cNvPr id="158" name="pl157"/>
+            <p:cNvPr id="173" name="pl172"/>
             <p:cNvSpPr/>
             <p:nvPr/>
           </p:nvSpPr>
@@ -8328,7 +8973,7 @@
         </p:sp>
         <p:sp>
           <p:nvSpPr>
-            <p:cNvPr id="159" name="pl158"/>
+            <p:cNvPr id="174" name="pl173"/>
             <p:cNvSpPr/>
             <p:nvPr/>
           </p:nvSpPr>
@@ -8368,13 +9013,13 @@
         </p:sp>
         <p:sp>
           <p:nvSpPr>
-            <p:cNvPr id="160" name="pl159"/>
-            <p:cNvSpPr/>
-            <p:nvPr/>
-          </p:nvSpPr>
-          <p:spPr>
-            <a:xfrm>
-              <a:off x="2245721" y="4172066"/>
+            <p:cNvPr id="175" name="pl174"/>
+            <p:cNvSpPr/>
+            <p:nvPr/>
+          </p:nvSpPr>
+          <p:spPr>
+            <a:xfrm>
+              <a:off x="1963390" y="4172066"/>
               <a:ext cx="0" cy="34794"/>
             </a:xfrm>
             <a:custGeom>
@@ -8408,13 +9053,13 @@
         </p:sp>
         <p:sp>
           <p:nvSpPr>
-            <p:cNvPr id="161" name="pl160"/>
-            <p:cNvSpPr/>
-            <p:nvPr/>
-          </p:nvSpPr>
-          <p:spPr>
-            <a:xfrm>
-              <a:off x="2810383" y="4172066"/>
+            <p:cNvPr id="176" name="pl175"/>
+            <p:cNvSpPr/>
+            <p:nvPr/>
+          </p:nvSpPr>
+          <p:spPr>
+            <a:xfrm>
+              <a:off x="2245721" y="4172066"/>
               <a:ext cx="0" cy="34794"/>
             </a:xfrm>
             <a:custGeom>
@@ -8448,13 +9093,13 @@
         </p:sp>
         <p:sp>
           <p:nvSpPr>
-            <p:cNvPr id="162" name="pl161"/>
-            <p:cNvSpPr/>
-            <p:nvPr/>
-          </p:nvSpPr>
-          <p:spPr>
-            <a:xfrm>
-              <a:off x="3375045" y="4172066"/>
+            <p:cNvPr id="177" name="pl176"/>
+            <p:cNvSpPr/>
+            <p:nvPr/>
+          </p:nvSpPr>
+          <p:spPr>
+            <a:xfrm>
+              <a:off x="2528052" y="4172066"/>
               <a:ext cx="0" cy="34794"/>
             </a:xfrm>
             <a:custGeom>
@@ -8488,13 +9133,13 @@
         </p:sp>
         <p:sp>
           <p:nvSpPr>
-            <p:cNvPr id="163" name="pl162"/>
-            <p:cNvSpPr/>
-            <p:nvPr/>
-          </p:nvSpPr>
-          <p:spPr>
-            <a:xfrm>
-              <a:off x="3939706" y="4172066"/>
+            <p:cNvPr id="178" name="pl177"/>
+            <p:cNvSpPr/>
+            <p:nvPr/>
+          </p:nvSpPr>
+          <p:spPr>
+            <a:xfrm>
+              <a:off x="2810383" y="4172066"/>
               <a:ext cx="0" cy="34794"/>
             </a:xfrm>
             <a:custGeom>
@@ -8528,13 +9173,13 @@
         </p:sp>
         <p:sp>
           <p:nvSpPr>
-            <p:cNvPr id="164" name="pl163"/>
-            <p:cNvSpPr/>
-            <p:nvPr/>
-          </p:nvSpPr>
-          <p:spPr>
-            <a:xfrm>
-              <a:off x="4504368" y="4172066"/>
+            <p:cNvPr id="179" name="pl178"/>
+            <p:cNvSpPr/>
+            <p:nvPr/>
+          </p:nvSpPr>
+          <p:spPr>
+            <a:xfrm>
+              <a:off x="3092714" y="4172066"/>
               <a:ext cx="0" cy="34794"/>
             </a:xfrm>
             <a:custGeom>
@@ -8568,13 +9213,13 @@
         </p:sp>
         <p:sp>
           <p:nvSpPr>
-            <p:cNvPr id="165" name="pl164"/>
-            <p:cNvSpPr/>
-            <p:nvPr/>
-          </p:nvSpPr>
-          <p:spPr>
-            <a:xfrm>
-              <a:off x="5069030" y="4172066"/>
+            <p:cNvPr id="180" name="pl179"/>
+            <p:cNvSpPr/>
+            <p:nvPr/>
+          </p:nvSpPr>
+          <p:spPr>
+            <a:xfrm>
+              <a:off x="3375045" y="4172066"/>
               <a:ext cx="0" cy="34794"/>
             </a:xfrm>
             <a:custGeom>
@@ -8608,13 +9253,13 @@
         </p:sp>
         <p:sp>
           <p:nvSpPr>
-            <p:cNvPr id="166" name="pl165"/>
-            <p:cNvSpPr/>
-            <p:nvPr/>
-          </p:nvSpPr>
-          <p:spPr>
-            <a:xfrm>
-              <a:off x="5633692" y="4172066"/>
+            <p:cNvPr id="181" name="pl180"/>
+            <p:cNvSpPr/>
+            <p:nvPr/>
+          </p:nvSpPr>
+          <p:spPr>
+            <a:xfrm>
+              <a:off x="3657376" y="4172066"/>
               <a:ext cx="0" cy="34794"/>
             </a:xfrm>
             <a:custGeom>
@@ -8648,7 +9293,287 @@
         </p:sp>
         <p:sp>
           <p:nvSpPr>
-            <p:cNvPr id="167" name="tx166"/>
+            <p:cNvPr id="182" name="pl181"/>
+            <p:cNvSpPr/>
+            <p:nvPr/>
+          </p:nvSpPr>
+          <p:spPr>
+            <a:xfrm>
+              <a:off x="3939706" y="4172066"/>
+              <a:ext cx="0" cy="34794"/>
+            </a:xfrm>
+            <a:custGeom>
+              <a:avLst/>
+              <a:pathLst>
+                <a:path w="0" h="34794">
+                  <a:moveTo>
+                    <a:pt x="0" y="34794"/>
+                  </a:moveTo>
+                  <a:lnTo>
+                    <a:pt x="0" y="0"/>
+                  </a:lnTo>
+                </a:path>
+              </a:pathLst>
+            </a:custGeom>
+            <a:ln w="13550" cap="flat">
+              <a:solidFill>
+                <a:srgbClr val="333333">
+                  <a:alpha val="100000"/>
+                </a:srgbClr>
+              </a:solidFill>
+              <a:prstDash val="solid"/>
+              <a:round/>
+            </a:ln>
+          </p:spPr>
+          <p:txBody>
+            <a:bodyPr/>
+            <a:lstStyle/>
+            <a:p/>
+          </p:txBody>
+        </p:sp>
+        <p:sp>
+          <p:nvSpPr>
+            <p:cNvPr id="183" name="pl182"/>
+            <p:cNvSpPr/>
+            <p:nvPr/>
+          </p:nvSpPr>
+          <p:spPr>
+            <a:xfrm>
+              <a:off x="4222037" y="4172066"/>
+              <a:ext cx="0" cy="34794"/>
+            </a:xfrm>
+            <a:custGeom>
+              <a:avLst/>
+              <a:pathLst>
+                <a:path w="0" h="34794">
+                  <a:moveTo>
+                    <a:pt x="0" y="34794"/>
+                  </a:moveTo>
+                  <a:lnTo>
+                    <a:pt x="0" y="0"/>
+                  </a:lnTo>
+                </a:path>
+              </a:pathLst>
+            </a:custGeom>
+            <a:ln w="13550" cap="flat">
+              <a:solidFill>
+                <a:srgbClr val="333333">
+                  <a:alpha val="100000"/>
+                </a:srgbClr>
+              </a:solidFill>
+              <a:prstDash val="solid"/>
+              <a:round/>
+            </a:ln>
+          </p:spPr>
+          <p:txBody>
+            <a:bodyPr/>
+            <a:lstStyle/>
+            <a:p/>
+          </p:txBody>
+        </p:sp>
+        <p:sp>
+          <p:nvSpPr>
+            <p:cNvPr id="184" name="pl183"/>
+            <p:cNvSpPr/>
+            <p:nvPr/>
+          </p:nvSpPr>
+          <p:spPr>
+            <a:xfrm>
+              <a:off x="4504368" y="4172066"/>
+              <a:ext cx="0" cy="34794"/>
+            </a:xfrm>
+            <a:custGeom>
+              <a:avLst/>
+              <a:pathLst>
+                <a:path w="0" h="34794">
+                  <a:moveTo>
+                    <a:pt x="0" y="34794"/>
+                  </a:moveTo>
+                  <a:lnTo>
+                    <a:pt x="0" y="0"/>
+                  </a:lnTo>
+                </a:path>
+              </a:pathLst>
+            </a:custGeom>
+            <a:ln w="13550" cap="flat">
+              <a:solidFill>
+                <a:srgbClr val="333333">
+                  <a:alpha val="100000"/>
+                </a:srgbClr>
+              </a:solidFill>
+              <a:prstDash val="solid"/>
+              <a:round/>
+            </a:ln>
+          </p:spPr>
+          <p:txBody>
+            <a:bodyPr/>
+            <a:lstStyle/>
+            <a:p/>
+          </p:txBody>
+        </p:sp>
+        <p:sp>
+          <p:nvSpPr>
+            <p:cNvPr id="185" name="pl184"/>
+            <p:cNvSpPr/>
+            <p:nvPr/>
+          </p:nvSpPr>
+          <p:spPr>
+            <a:xfrm>
+              <a:off x="4786699" y="4172066"/>
+              <a:ext cx="0" cy="34794"/>
+            </a:xfrm>
+            <a:custGeom>
+              <a:avLst/>
+              <a:pathLst>
+                <a:path w="0" h="34794">
+                  <a:moveTo>
+                    <a:pt x="0" y="34794"/>
+                  </a:moveTo>
+                  <a:lnTo>
+                    <a:pt x="0" y="0"/>
+                  </a:lnTo>
+                </a:path>
+              </a:pathLst>
+            </a:custGeom>
+            <a:ln w="13550" cap="flat">
+              <a:solidFill>
+                <a:srgbClr val="333333">
+                  <a:alpha val="100000"/>
+                </a:srgbClr>
+              </a:solidFill>
+              <a:prstDash val="solid"/>
+              <a:round/>
+            </a:ln>
+          </p:spPr>
+          <p:txBody>
+            <a:bodyPr/>
+            <a:lstStyle/>
+            <a:p/>
+          </p:txBody>
+        </p:sp>
+        <p:sp>
+          <p:nvSpPr>
+            <p:cNvPr id="186" name="pl185"/>
+            <p:cNvSpPr/>
+            <p:nvPr/>
+          </p:nvSpPr>
+          <p:spPr>
+            <a:xfrm>
+              <a:off x="5069030" y="4172066"/>
+              <a:ext cx="0" cy="34794"/>
+            </a:xfrm>
+            <a:custGeom>
+              <a:avLst/>
+              <a:pathLst>
+                <a:path w="0" h="34794">
+                  <a:moveTo>
+                    <a:pt x="0" y="34794"/>
+                  </a:moveTo>
+                  <a:lnTo>
+                    <a:pt x="0" y="0"/>
+                  </a:lnTo>
+                </a:path>
+              </a:pathLst>
+            </a:custGeom>
+            <a:ln w="13550" cap="flat">
+              <a:solidFill>
+                <a:srgbClr val="333333">
+                  <a:alpha val="100000"/>
+                </a:srgbClr>
+              </a:solidFill>
+              <a:prstDash val="solid"/>
+              <a:round/>
+            </a:ln>
+          </p:spPr>
+          <p:txBody>
+            <a:bodyPr/>
+            <a:lstStyle/>
+            <a:p/>
+          </p:txBody>
+        </p:sp>
+        <p:sp>
+          <p:nvSpPr>
+            <p:cNvPr id="187" name="pl186"/>
+            <p:cNvSpPr/>
+            <p:nvPr/>
+          </p:nvSpPr>
+          <p:spPr>
+            <a:xfrm>
+              <a:off x="5351361" y="4172066"/>
+              <a:ext cx="0" cy="34794"/>
+            </a:xfrm>
+            <a:custGeom>
+              <a:avLst/>
+              <a:pathLst>
+                <a:path w="0" h="34794">
+                  <a:moveTo>
+                    <a:pt x="0" y="34794"/>
+                  </a:moveTo>
+                  <a:lnTo>
+                    <a:pt x="0" y="0"/>
+                  </a:lnTo>
+                </a:path>
+              </a:pathLst>
+            </a:custGeom>
+            <a:ln w="13550" cap="flat">
+              <a:solidFill>
+                <a:srgbClr val="333333">
+                  <a:alpha val="100000"/>
+                </a:srgbClr>
+              </a:solidFill>
+              <a:prstDash val="solid"/>
+              <a:round/>
+            </a:ln>
+          </p:spPr>
+          <p:txBody>
+            <a:bodyPr/>
+            <a:lstStyle/>
+            <a:p/>
+          </p:txBody>
+        </p:sp>
+        <p:sp>
+          <p:nvSpPr>
+            <p:cNvPr id="188" name="pl187"/>
+            <p:cNvSpPr/>
+            <p:nvPr/>
+          </p:nvSpPr>
+          <p:spPr>
+            <a:xfrm>
+              <a:off x="5633692" y="4172066"/>
+              <a:ext cx="0" cy="34794"/>
+            </a:xfrm>
+            <a:custGeom>
+              <a:avLst/>
+              <a:pathLst>
+                <a:path w="0" h="34794">
+                  <a:moveTo>
+                    <a:pt x="0" y="34794"/>
+                  </a:moveTo>
+                  <a:lnTo>
+                    <a:pt x="0" y="0"/>
+                  </a:lnTo>
+                </a:path>
+              </a:pathLst>
+            </a:custGeom>
+            <a:ln w="13550" cap="flat">
+              <a:solidFill>
+                <a:srgbClr val="333333">
+                  <a:alpha val="100000"/>
+                </a:srgbClr>
+              </a:solidFill>
+              <a:prstDash val="solid"/>
+              <a:round/>
+            </a:ln>
+          </p:spPr>
+          <p:txBody>
+            <a:bodyPr/>
+            <a:lstStyle/>
+            <a:p/>
+          </p:txBody>
+        </p:sp>
+        <p:sp>
+          <p:nvSpPr>
+            <p:cNvPr id="189" name="tx188"/>
             <p:cNvSpPr/>
             <p:nvPr/>
           </p:nvSpPr>
@@ -8694,7 +9619,53 @@
         </p:sp>
         <p:sp>
           <p:nvSpPr>
-            <p:cNvPr id="168" name="tx167"/>
+            <p:cNvPr id="190" name="tx189"/>
+            <p:cNvSpPr/>
+            <p:nvPr/>
+          </p:nvSpPr>
+          <p:spPr>
+            <a:xfrm>
+              <a:off x="1932312" y="4234696"/>
+              <a:ext cx="62155" cy="80000"/>
+            </a:xfrm>
+            <a:prstGeom prst="rect">
+              <a:avLst/>
+            </a:prstGeom>
+            <a:noFill/>
+          </p:spPr>
+          <p:txBody>
+            <a:bodyPr lIns="0" rIns="0" tIns="0" bIns="0" anchorCtr="1" anchor="ctr" wrap="none"/>
+            <a:lstStyle/>
+            <a:p>
+              <a:pPr algn="l" marL="0" marR="0" indent="0">
+                <a:lnSpc>
+                  <a:spcPts val="880"/>
+                </a:lnSpc>
+                <a:spcBef>
+                  <a:spcPts val="0"/>
+                </a:spcBef>
+                <a:spcAft>
+                  <a:spcPts val="0"/>
+                </a:spcAft>
+              </a:pPr>
+              <a:r>
+                <a:rPr sz="880">
+                  <a:solidFill>
+                    <a:srgbClr val="4D4D4D">
+                      <a:alpha val="100000"/>
+                    </a:srgbClr>
+                  </a:solidFill>
+                  <a:latin typeface="Arial"/>
+                  <a:cs typeface="Arial"/>
+                </a:rPr>
+                <a:t>4</a:t>
+              </a:r>
+            </a:p>
+          </p:txBody>
+        </p:sp>
+        <p:sp>
+          <p:nvSpPr>
+            <p:cNvPr id="191" name="tx190"/>
             <p:cNvSpPr/>
             <p:nvPr/>
           </p:nvSpPr>
@@ -8740,7 +9711,53 @@
         </p:sp>
         <p:sp>
           <p:nvSpPr>
-            <p:cNvPr id="169" name="tx168"/>
+            <p:cNvPr id="192" name="tx191"/>
+            <p:cNvSpPr/>
+            <p:nvPr/>
+          </p:nvSpPr>
+          <p:spPr>
+            <a:xfrm>
+              <a:off x="2465896" y="4234369"/>
+              <a:ext cx="124311" cy="80327"/>
+            </a:xfrm>
+            <a:prstGeom prst="rect">
+              <a:avLst/>
+            </a:prstGeom>
+            <a:noFill/>
+          </p:spPr>
+          <p:txBody>
+            <a:bodyPr lIns="0" rIns="0" tIns="0" bIns="0" anchorCtr="1" anchor="ctr" wrap="none"/>
+            <a:lstStyle/>
+            <a:p>
+              <a:pPr algn="l" marL="0" marR="0" indent="0">
+                <a:lnSpc>
+                  <a:spcPts val="880"/>
+                </a:lnSpc>
+                <a:spcBef>
+                  <a:spcPts val="0"/>
+                </a:spcBef>
+                <a:spcAft>
+                  <a:spcPts val="0"/>
+                </a:spcAft>
+              </a:pPr>
+              <a:r>
+                <a:rPr sz="880">
+                  <a:solidFill>
+                    <a:srgbClr val="4D4D4D">
+                      <a:alpha val="100000"/>
+                    </a:srgbClr>
+                  </a:solidFill>
+                  <a:latin typeface="Arial"/>
+                  <a:cs typeface="Arial"/>
+                </a:rPr>
+                <a:t>12</a:t>
+              </a:r>
+            </a:p>
+          </p:txBody>
+        </p:sp>
+        <p:sp>
+          <p:nvSpPr>
+            <p:cNvPr id="193" name="tx192"/>
             <p:cNvSpPr/>
             <p:nvPr/>
           </p:nvSpPr>
@@ -8786,7 +9803,53 @@
         </p:sp>
         <p:sp>
           <p:nvSpPr>
-            <p:cNvPr id="170" name="tx169"/>
+            <p:cNvPr id="194" name="tx193"/>
+            <p:cNvSpPr/>
+            <p:nvPr/>
+          </p:nvSpPr>
+          <p:spPr>
+            <a:xfrm>
+              <a:off x="3030558" y="4233005"/>
+              <a:ext cx="124311" cy="81691"/>
+            </a:xfrm>
+            <a:prstGeom prst="rect">
+              <a:avLst/>
+            </a:prstGeom>
+            <a:noFill/>
+          </p:spPr>
+          <p:txBody>
+            <a:bodyPr lIns="0" rIns="0" tIns="0" bIns="0" anchorCtr="1" anchor="ctr" wrap="none"/>
+            <a:lstStyle/>
+            <a:p>
+              <a:pPr algn="l" marL="0" marR="0" indent="0">
+                <a:lnSpc>
+                  <a:spcPts val="880"/>
+                </a:lnSpc>
+                <a:spcBef>
+                  <a:spcPts val="0"/>
+                </a:spcBef>
+                <a:spcAft>
+                  <a:spcPts val="0"/>
+                </a:spcAft>
+              </a:pPr>
+              <a:r>
+                <a:rPr sz="880">
+                  <a:solidFill>
+                    <a:srgbClr val="4D4D4D">
+                      <a:alpha val="100000"/>
+                    </a:srgbClr>
+                  </a:solidFill>
+                  <a:latin typeface="Arial"/>
+                  <a:cs typeface="Arial"/>
+                </a:rPr>
+                <a:t>20</a:t>
+              </a:r>
+            </a:p>
+          </p:txBody>
+        </p:sp>
+        <p:sp>
+          <p:nvSpPr>
+            <p:cNvPr id="195" name="tx194"/>
             <p:cNvSpPr/>
             <p:nvPr/>
           </p:nvSpPr>
@@ -8832,7 +9895,53 @@
         </p:sp>
         <p:sp>
           <p:nvSpPr>
-            <p:cNvPr id="171" name="tx170"/>
+            <p:cNvPr id="196" name="tx195"/>
+            <p:cNvSpPr/>
+            <p:nvPr/>
+          </p:nvSpPr>
+          <p:spPr>
+            <a:xfrm>
+              <a:off x="3595220" y="4233005"/>
+              <a:ext cx="124311" cy="81691"/>
+            </a:xfrm>
+            <a:prstGeom prst="rect">
+              <a:avLst/>
+            </a:prstGeom>
+            <a:noFill/>
+          </p:spPr>
+          <p:txBody>
+            <a:bodyPr lIns="0" rIns="0" tIns="0" bIns="0" anchorCtr="1" anchor="ctr" wrap="none"/>
+            <a:lstStyle/>
+            <a:p>
+              <a:pPr algn="l" marL="0" marR="0" indent="0">
+                <a:lnSpc>
+                  <a:spcPts val="880"/>
+                </a:lnSpc>
+                <a:spcBef>
+                  <a:spcPts val="0"/>
+                </a:spcBef>
+                <a:spcAft>
+                  <a:spcPts val="0"/>
+                </a:spcAft>
+              </a:pPr>
+              <a:r>
+                <a:rPr sz="880">
+                  <a:solidFill>
+                    <a:srgbClr val="4D4D4D">
+                      <a:alpha val="100000"/>
+                    </a:srgbClr>
+                  </a:solidFill>
+                  <a:latin typeface="Arial"/>
+                  <a:cs typeface="Arial"/>
+                </a:rPr>
+                <a:t>28</a:t>
+              </a:r>
+            </a:p>
+          </p:txBody>
+        </p:sp>
+        <p:sp>
+          <p:nvSpPr>
+            <p:cNvPr id="197" name="tx196"/>
             <p:cNvSpPr/>
             <p:nvPr/>
           </p:nvSpPr>
@@ -8878,7 +9987,53 @@
         </p:sp>
         <p:sp>
           <p:nvSpPr>
-            <p:cNvPr id="172" name="tx171"/>
+            <p:cNvPr id="198" name="tx197"/>
+            <p:cNvSpPr/>
+            <p:nvPr/>
+          </p:nvSpPr>
+          <p:spPr>
+            <a:xfrm>
+              <a:off x="4159882" y="4232950"/>
+              <a:ext cx="124311" cy="81746"/>
+            </a:xfrm>
+            <a:prstGeom prst="rect">
+              <a:avLst/>
+            </a:prstGeom>
+            <a:noFill/>
+          </p:spPr>
+          <p:txBody>
+            <a:bodyPr lIns="0" rIns="0" tIns="0" bIns="0" anchorCtr="1" anchor="ctr" wrap="none"/>
+            <a:lstStyle/>
+            <a:p>
+              <a:pPr algn="l" marL="0" marR="0" indent="0">
+                <a:lnSpc>
+                  <a:spcPts val="880"/>
+                </a:lnSpc>
+                <a:spcBef>
+                  <a:spcPts val="0"/>
+                </a:spcBef>
+                <a:spcAft>
+                  <a:spcPts val="0"/>
+                </a:spcAft>
+              </a:pPr>
+              <a:r>
+                <a:rPr sz="880">
+                  <a:solidFill>
+                    <a:srgbClr val="4D4D4D">
+                      <a:alpha val="100000"/>
+                    </a:srgbClr>
+                  </a:solidFill>
+                  <a:latin typeface="Arial"/>
+                  <a:cs typeface="Arial"/>
+                </a:rPr>
+                <a:t>36</a:t>
+              </a:r>
+            </a:p>
+          </p:txBody>
+        </p:sp>
+        <p:sp>
+          <p:nvSpPr>
+            <p:cNvPr id="199" name="tx198"/>
             <p:cNvSpPr/>
             <p:nvPr/>
           </p:nvSpPr>
@@ -8924,7 +10079,53 @@
         </p:sp>
         <p:sp>
           <p:nvSpPr>
-            <p:cNvPr id="173" name="tx172"/>
+            <p:cNvPr id="200" name="tx199"/>
+            <p:cNvSpPr/>
+            <p:nvPr/>
+          </p:nvSpPr>
+          <p:spPr>
+            <a:xfrm>
+              <a:off x="4724544" y="4234696"/>
+              <a:ext cx="124311" cy="80000"/>
+            </a:xfrm>
+            <a:prstGeom prst="rect">
+              <a:avLst/>
+            </a:prstGeom>
+            <a:noFill/>
+          </p:spPr>
+          <p:txBody>
+            <a:bodyPr lIns="0" rIns="0" tIns="0" bIns="0" anchorCtr="1" anchor="ctr" wrap="none"/>
+            <a:lstStyle/>
+            <a:p>
+              <a:pPr algn="l" marL="0" marR="0" indent="0">
+                <a:lnSpc>
+                  <a:spcPts val="880"/>
+                </a:lnSpc>
+                <a:spcBef>
+                  <a:spcPts val="0"/>
+                </a:spcBef>
+                <a:spcAft>
+                  <a:spcPts val="0"/>
+                </a:spcAft>
+              </a:pPr>
+              <a:r>
+                <a:rPr sz="880">
+                  <a:solidFill>
+                    <a:srgbClr val="4D4D4D">
+                      <a:alpha val="100000"/>
+                    </a:srgbClr>
+                  </a:solidFill>
+                  <a:latin typeface="Arial"/>
+                  <a:cs typeface="Arial"/>
+                </a:rPr>
+                <a:t>44</a:t>
+              </a:r>
+            </a:p>
+          </p:txBody>
+        </p:sp>
+        <p:sp>
+          <p:nvSpPr>
+            <p:cNvPr id="201" name="tx200"/>
             <p:cNvSpPr/>
             <p:nvPr/>
           </p:nvSpPr>
@@ -8970,7 +10171,53 @@
         </p:sp>
         <p:sp>
           <p:nvSpPr>
-            <p:cNvPr id="174" name="tx173"/>
+            <p:cNvPr id="202" name="tx201"/>
+            <p:cNvSpPr/>
+            <p:nvPr/>
+          </p:nvSpPr>
+          <p:spPr>
+            <a:xfrm>
+              <a:off x="5289205" y="4233005"/>
+              <a:ext cx="124311" cy="81691"/>
+            </a:xfrm>
+            <a:prstGeom prst="rect">
+              <a:avLst/>
+            </a:prstGeom>
+            <a:noFill/>
+          </p:spPr>
+          <p:txBody>
+            <a:bodyPr lIns="0" rIns="0" tIns="0" bIns="0" anchorCtr="1" anchor="ctr" wrap="none"/>
+            <a:lstStyle/>
+            <a:p>
+              <a:pPr algn="l" marL="0" marR="0" indent="0">
+                <a:lnSpc>
+                  <a:spcPts val="880"/>
+                </a:lnSpc>
+                <a:spcBef>
+                  <a:spcPts val="0"/>
+                </a:spcBef>
+                <a:spcAft>
+                  <a:spcPts val="0"/>
+                </a:spcAft>
+              </a:pPr>
+              <a:r>
+                <a:rPr sz="880">
+                  <a:solidFill>
+                    <a:srgbClr val="4D4D4D">
+                      <a:alpha val="100000"/>
+                    </a:srgbClr>
+                  </a:solidFill>
+                  <a:latin typeface="Arial"/>
+                  <a:cs typeface="Arial"/>
+                </a:rPr>
+                <a:t>52</a:t>
+              </a:r>
+            </a:p>
+          </p:txBody>
+        </p:sp>
+        <p:sp>
+          <p:nvSpPr>
+            <p:cNvPr id="203" name="tx202"/>
             <p:cNvSpPr/>
             <p:nvPr/>
           </p:nvSpPr>
@@ -9016,7 +10263,7 @@
         </p:sp>
         <p:sp>
           <p:nvSpPr>
-            <p:cNvPr id="175" name="tx174"/>
+            <p:cNvPr id="204" name="tx203"/>
             <p:cNvSpPr/>
             <p:nvPr/>
           </p:nvSpPr>
@@ -9062,7 +10309,7 @@
         </p:sp>
         <p:sp>
           <p:nvSpPr>
-            <p:cNvPr id="176" name="tx175"/>
+            <p:cNvPr id="205" name="tx204"/>
             <p:cNvSpPr/>
             <p:nvPr/>
           </p:nvSpPr>
@@ -9108,7 +10355,7 @@
         </p:sp>
         <p:sp>
           <p:nvSpPr>
-            <p:cNvPr id="177" name="rc176"/>
+            <p:cNvPr id="206" name="rc205"/>
             <p:cNvSpPr/>
             <p:nvPr/>
           </p:nvSpPr>
@@ -9134,7 +10381,7 @@
         </p:sp>
         <p:sp>
           <p:nvSpPr>
-            <p:cNvPr id="178" name="tx177"/>
+            <p:cNvPr id="207" name="tx206"/>
             <p:cNvSpPr/>
             <p:nvPr/>
           </p:nvSpPr>
@@ -9180,7 +10427,7 @@
         </p:sp>
         <p:sp>
           <p:nvSpPr>
-            <p:cNvPr id="179" name="rc178"/>
+            <p:cNvPr id="208" name="rc207"/>
             <p:cNvSpPr/>
             <p:nvPr/>
           </p:nvSpPr>
@@ -9206,7 +10453,7 @@
         </p:sp>
         <p:sp>
           <p:nvSpPr>
-            <p:cNvPr id="180" name="pl179"/>
+            <p:cNvPr id="209" name="pl208"/>
             <p:cNvSpPr/>
             <p:nvPr/>
           </p:nvSpPr>
@@ -9246,7 +10493,7 @@
         </p:sp>
         <p:sp>
           <p:nvSpPr>
-            <p:cNvPr id="181" name="pt180"/>
+            <p:cNvPr id="210" name="pt209"/>
             <p:cNvSpPr/>
             <p:nvPr/>
           </p:nvSpPr>
@@ -9281,7 +10528,7 @@
         </p:sp>
         <p:sp>
           <p:nvSpPr>
-            <p:cNvPr id="182" name="rc181"/>
+            <p:cNvPr id="211" name="rc210"/>
             <p:cNvSpPr/>
             <p:nvPr/>
           </p:nvSpPr>
@@ -9307,7 +10554,7 @@
         </p:sp>
         <p:sp>
           <p:nvSpPr>
-            <p:cNvPr id="183" name="pl182"/>
+            <p:cNvPr id="212" name="pl211"/>
             <p:cNvSpPr/>
             <p:nvPr/>
           </p:nvSpPr>
@@ -9347,7 +10594,7 @@
         </p:sp>
         <p:sp>
           <p:nvSpPr>
-            <p:cNvPr id="184" name="pt183"/>
+            <p:cNvPr id="213" name="pt212"/>
             <p:cNvSpPr/>
             <p:nvPr/>
           </p:nvSpPr>
@@ -9382,7 +10629,7 @@
         </p:sp>
         <p:sp>
           <p:nvSpPr>
-            <p:cNvPr id="185" name="rc184"/>
+            <p:cNvPr id="214" name="rc213"/>
             <p:cNvSpPr/>
             <p:nvPr/>
           </p:nvSpPr>
@@ -9408,7 +10655,7 @@
         </p:sp>
         <p:sp>
           <p:nvSpPr>
-            <p:cNvPr id="186" name="pl185"/>
+            <p:cNvPr id="215" name="pl214"/>
             <p:cNvSpPr/>
             <p:nvPr/>
           </p:nvSpPr>
@@ -9448,7 +10695,7 @@
         </p:sp>
         <p:sp>
           <p:nvSpPr>
-            <p:cNvPr id="187" name="pt186"/>
+            <p:cNvPr id="216" name="pt215"/>
             <p:cNvSpPr/>
             <p:nvPr/>
           </p:nvSpPr>
@@ -9483,7 +10730,7 @@
         </p:sp>
         <p:sp>
           <p:nvSpPr>
-            <p:cNvPr id="188" name="rc187"/>
+            <p:cNvPr id="217" name="rc216"/>
             <p:cNvSpPr/>
             <p:nvPr/>
           </p:nvSpPr>
@@ -9509,7 +10756,7 @@
         </p:sp>
         <p:sp>
           <p:nvSpPr>
-            <p:cNvPr id="189" name="pl188"/>
+            <p:cNvPr id="218" name="pl217"/>
             <p:cNvSpPr/>
             <p:nvPr/>
           </p:nvSpPr>
@@ -9549,7 +10796,7 @@
         </p:sp>
         <p:sp>
           <p:nvSpPr>
-            <p:cNvPr id="190" name="pt189"/>
+            <p:cNvPr id="219" name="pt218"/>
             <p:cNvSpPr/>
             <p:nvPr/>
           </p:nvSpPr>
@@ -9584,7 +10831,7 @@
         </p:sp>
         <p:sp>
           <p:nvSpPr>
-            <p:cNvPr id="191" name="tx190"/>
+            <p:cNvPr id="220" name="tx219"/>
             <p:cNvSpPr/>
             <p:nvPr/>
           </p:nvSpPr>
@@ -9630,7 +10877,7 @@
         </p:sp>
         <p:sp>
           <p:nvSpPr>
-            <p:cNvPr id="192" name="tx191"/>
+            <p:cNvPr id="221" name="tx220"/>
             <p:cNvSpPr/>
             <p:nvPr/>
           </p:nvSpPr>
@@ -9676,7 +10923,7 @@
         </p:sp>
         <p:sp>
           <p:nvSpPr>
-            <p:cNvPr id="193" name="tx192"/>
+            <p:cNvPr id="222" name="tx221"/>
             <p:cNvSpPr/>
             <p:nvPr/>
           </p:nvSpPr>
@@ -9722,7 +10969,7 @@
         </p:sp>
         <p:sp>
           <p:nvSpPr>
-            <p:cNvPr id="194" name="tx193"/>
+            <p:cNvPr id="223" name="tx222"/>
             <p:cNvSpPr/>
             <p:nvPr/>
           </p:nvSpPr>

</xml_diff>